<commit_message>
Adding commit message header picture
Still needed to overview all APP MAterials user comments
</commit_message>
<xml_diff>
--- a/WorkStuff/Courses/Git/Git_General_Training_Lab/Git_General_Training_ap.ppt.pptx
+++ b/WorkStuff/Courses/Git/Git_General_Training_Lab/Git_General_Training_ap.ppt.pptx
@@ -58,26 +58,27 @@
     <p:sldId id="303" r:id="rId52"/>
     <p:sldId id="304" r:id="rId53"/>
     <p:sldId id="305" r:id="rId54"/>
+    <p:sldId id="306" r:id="rId55"/>
   </p:sldIdLst>
   <p:sldSz cy="6858000" cx="9144000"/>
   <p:notesSz cx="6934200" cy="9232900"/>
   <p:embeddedFontLst>
     <p:embeddedFont>
       <p:font typeface="Amatic SC"/>
-      <p:regular r:id="rId55"/>
-      <p:bold r:id="rId56"/>
+      <p:regular r:id="rId56"/>
+      <p:bold r:id="rId57"/>
     </p:embeddedFont>
     <p:embeddedFont>
       <p:font typeface="Source Code Pro"/>
-      <p:regular r:id="rId57"/>
-      <p:bold r:id="rId58"/>
+      <p:regular r:id="rId58"/>
+      <p:bold r:id="rId59"/>
     </p:embeddedFont>
     <p:embeddedFont>
       <p:font typeface="Merriweather"/>
-      <p:regular r:id="rId59"/>
-      <p:bold r:id="rId60"/>
-      <p:italic r:id="rId61"/>
-      <p:boldItalic r:id="rId62"/>
+      <p:regular r:id="rId60"/>
+      <p:bold r:id="rId61"/>
+      <p:italic r:id="rId62"/>
+      <p:boldItalic r:id="rId63"/>
     </p:embeddedFont>
   </p:embeddedFontLst>
   <p:defaultTextStyle>
@@ -4297,42 +4298,6 @@
       <p:sp>
         <p:nvSpPr>
           <p:cNvPr id="570" name="Shape 570"/>
-          <p:cNvSpPr txBox="1"/>
-          <p:nvPr>
-            <p:ph idx="1" type="body"/>
-          </p:nvPr>
-        </p:nvSpPr>
-        <p:spPr>
-          <a:xfrm>
-            <a:off x="923925" y="4386262"/>
-            <a:ext cx="5086350" cy="4154487"/>
-          </a:xfrm>
-          <a:prstGeom prst="rect">
-            <a:avLst/>
-          </a:prstGeom>
-        </p:spPr>
-        <p:txBody>
-          <a:bodyPr anchorCtr="0" anchor="t" bIns="91425" lIns="91425" rIns="91425" wrap="square" tIns="91425">
-            <a:noAutofit/>
-          </a:bodyPr>
-          <a:lstStyle/>
-          <a:p>
-            <a:pPr lvl="0">
-              <a:spcBef>
-                <a:spcPts val="0"/>
-              </a:spcBef>
-              <a:buNone/>
-            </a:pPr>
-            <a:r>
-              <a:t/>
-            </a:r>
-            <a:endParaRPr/>
-          </a:p>
-        </p:txBody>
-      </p:sp>
-      <p:sp>
-        <p:nvSpPr>
-          <p:cNvPr id="571" name="Shape 571"/>
           <p:cNvSpPr/>
           <p:nvPr>
             <p:ph idx="2" type="sldImg"/>
@@ -4341,7 +4306,7 @@
         <p:spPr>
           <a:xfrm>
             <a:off x="1158875" y="692150"/>
-            <a:ext cx="4616450" cy="3462337"/>
+            <a:ext cx="4616400" cy="3462300"/>
           </a:xfrm>
           <a:custGeom>
             <a:pathLst>
@@ -4363,6 +4328,83 @@
             </a:pathLst>
           </a:custGeom>
         </p:spPr>
+      </p:sp>
+      <p:sp>
+        <p:nvSpPr>
+          <p:cNvPr id="571" name="Shape 571"/>
+          <p:cNvSpPr txBox="1"/>
+          <p:nvPr>
+            <p:ph idx="1" type="body"/>
+          </p:nvPr>
+        </p:nvSpPr>
+        <p:spPr>
+          <a:xfrm>
+            <a:off x="923925" y="4386262"/>
+            <a:ext cx="5086200" cy="4154400"/>
+          </a:xfrm>
+          <a:prstGeom prst="rect">
+            <a:avLst/>
+          </a:prstGeom>
+        </p:spPr>
+        <p:txBody>
+          <a:bodyPr anchorCtr="0" anchor="t" bIns="91425" lIns="91425" rIns="91425" wrap="square" tIns="91425">
+            <a:noAutofit/>
+          </a:bodyPr>
+          <a:lstStyle/>
+          <a:p>
+            <a:pPr lvl="0">
+              <a:spcBef>
+                <a:spcPts val="0"/>
+              </a:spcBef>
+              <a:buNone/>
+            </a:pPr>
+            <a:r>
+              <a:t/>
+            </a:r>
+            <a:endParaRPr/>
+          </a:p>
+        </p:txBody>
+      </p:sp>
+      <p:sp>
+        <p:nvSpPr>
+          <p:cNvPr id="572" name="Shape 572"/>
+          <p:cNvSpPr txBox="1"/>
+          <p:nvPr>
+            <p:ph idx="12" type="sldNum"/>
+          </p:nvPr>
+        </p:nvSpPr>
+        <p:spPr>
+          <a:xfrm>
+            <a:off x="3929062" y="8770937"/>
+            <a:ext cx="3005100" cy="462000"/>
+          </a:xfrm>
+          <a:prstGeom prst="rect">
+            <a:avLst/>
+          </a:prstGeom>
+        </p:spPr>
+        <p:txBody>
+          <a:bodyPr anchorCtr="0" anchor="b" bIns="46175" lIns="92375" rIns="92375" wrap="square" tIns="46175">
+            <a:noAutofit/>
+          </a:bodyPr>
+          <a:lstStyle/>
+          <a:p>
+            <a:pPr lvl="0">
+              <a:spcBef>
+                <a:spcPts val="0"/>
+              </a:spcBef>
+              <a:buClr>
+                <a:srgbClr val="000000"/>
+              </a:buClr>
+              <a:buSzPct val="25000"/>
+              <a:buFont typeface="Arial"/>
+              <a:buNone/>
+            </a:pPr>
+            <a:fld id="{00000000-1234-1234-1234-123412341234}" type="slidenum">
+              <a:rPr lang="en-US"/>
+              <a:t>‹#›</a:t>
+            </a:fld>
+          </a:p>
+        </p:txBody>
       </p:sp>
     </p:spTree>
   </p:cSld>
@@ -4392,6 +4434,42 @@
       <p:sp>
         <p:nvSpPr>
           <p:cNvPr id="578" name="Shape 578"/>
+          <p:cNvSpPr txBox="1"/>
+          <p:nvPr>
+            <p:ph idx="1" type="body"/>
+          </p:nvPr>
+        </p:nvSpPr>
+        <p:spPr>
+          <a:xfrm>
+            <a:off x="923925" y="4386262"/>
+            <a:ext cx="5086350" cy="4154487"/>
+          </a:xfrm>
+          <a:prstGeom prst="rect">
+            <a:avLst/>
+          </a:prstGeom>
+        </p:spPr>
+        <p:txBody>
+          <a:bodyPr anchorCtr="0" anchor="t" bIns="91425" lIns="91425" rIns="91425" wrap="square" tIns="91425">
+            <a:noAutofit/>
+          </a:bodyPr>
+          <a:lstStyle/>
+          <a:p>
+            <a:pPr lvl="0">
+              <a:spcBef>
+                <a:spcPts val="0"/>
+              </a:spcBef>
+              <a:buNone/>
+            </a:pPr>
+            <a:r>
+              <a:t/>
+            </a:r>
+            <a:endParaRPr/>
+          </a:p>
+        </p:txBody>
+      </p:sp>
+      <p:sp>
+        <p:nvSpPr>
+          <p:cNvPr id="579" name="Shape 579"/>
           <p:cNvSpPr/>
           <p:nvPr>
             <p:ph idx="2" type="sldImg"/>
@@ -4400,7 +4478,7 @@
         <p:spPr>
           <a:xfrm>
             <a:off x="1158875" y="692150"/>
-            <a:ext cx="4616400" cy="3462300"/>
+            <a:ext cx="4616450" cy="3462337"/>
           </a:xfrm>
           <a:custGeom>
             <a:pathLst>
@@ -4423,83 +4501,6 @@
           </a:custGeom>
         </p:spPr>
       </p:sp>
-      <p:sp>
-        <p:nvSpPr>
-          <p:cNvPr id="579" name="Shape 579"/>
-          <p:cNvSpPr txBox="1"/>
-          <p:nvPr>
-            <p:ph idx="1" type="body"/>
-          </p:nvPr>
-        </p:nvSpPr>
-        <p:spPr>
-          <a:xfrm>
-            <a:off x="923925" y="4386262"/>
-            <a:ext cx="5086200" cy="4154400"/>
-          </a:xfrm>
-          <a:prstGeom prst="rect">
-            <a:avLst/>
-          </a:prstGeom>
-        </p:spPr>
-        <p:txBody>
-          <a:bodyPr anchorCtr="0" anchor="t" bIns="91425" lIns="91425" rIns="91425" wrap="square" tIns="91425">
-            <a:noAutofit/>
-          </a:bodyPr>
-          <a:lstStyle/>
-          <a:p>
-            <a:pPr lvl="0">
-              <a:spcBef>
-                <a:spcPts val="0"/>
-              </a:spcBef>
-              <a:buNone/>
-            </a:pPr>
-            <a:r>
-              <a:t/>
-            </a:r>
-            <a:endParaRPr/>
-          </a:p>
-        </p:txBody>
-      </p:sp>
-      <p:sp>
-        <p:nvSpPr>
-          <p:cNvPr id="580" name="Shape 580"/>
-          <p:cNvSpPr txBox="1"/>
-          <p:nvPr>
-            <p:ph idx="12" type="sldNum"/>
-          </p:nvPr>
-        </p:nvSpPr>
-        <p:spPr>
-          <a:xfrm>
-            <a:off x="3929062" y="8770937"/>
-            <a:ext cx="3005100" cy="462000"/>
-          </a:xfrm>
-          <a:prstGeom prst="rect">
-            <a:avLst/>
-          </a:prstGeom>
-        </p:spPr>
-        <p:txBody>
-          <a:bodyPr anchorCtr="0" anchor="b" bIns="46175" lIns="92375" rIns="92375" wrap="square" tIns="46175">
-            <a:noAutofit/>
-          </a:bodyPr>
-          <a:lstStyle/>
-          <a:p>
-            <a:pPr lvl="0">
-              <a:spcBef>
-                <a:spcPts val="0"/>
-              </a:spcBef>
-              <a:buClr>
-                <a:srgbClr val="000000"/>
-              </a:buClr>
-              <a:buSzPct val="25000"/>
-              <a:buFont typeface="Arial"/>
-              <a:buNone/>
-            </a:pPr>
-            <a:fld id="{00000000-1234-1234-1234-123412341234}" type="slidenum">
-              <a:rPr lang="en-US"/>
-              <a:t>‹#›</a:t>
-            </a:fld>
-          </a:p>
-        </p:txBody>
-      </p:sp>
     </p:spTree>
   </p:cSld>
   <p:clrMapOvr>
@@ -4513,7 +4514,7 @@
   <p:cSld>
     <p:spTree>
       <p:nvGrpSpPr>
-        <p:cNvPr id="586" name="Shape 586"/>
+        <p:cNvPr id="585" name="Shape 585"/>
         <p:cNvGrpSpPr/>
         <p:nvPr/>
       </p:nvGrpSpPr>
@@ -4527,43 +4528,7 @@
       </p:grpSpPr>
       <p:sp>
         <p:nvSpPr>
-          <p:cNvPr id="587" name="Shape 587"/>
-          <p:cNvSpPr txBox="1"/>
-          <p:nvPr>
-            <p:ph idx="1" type="body"/>
-          </p:nvPr>
-        </p:nvSpPr>
-        <p:spPr>
-          <a:xfrm>
-            <a:off x="923925" y="4386262"/>
-            <a:ext cx="5086350" cy="4154487"/>
-          </a:xfrm>
-          <a:prstGeom prst="rect">
-            <a:avLst/>
-          </a:prstGeom>
-        </p:spPr>
-        <p:txBody>
-          <a:bodyPr anchorCtr="0" anchor="t" bIns="91425" lIns="91425" rIns="91425" wrap="square" tIns="91425">
-            <a:noAutofit/>
-          </a:bodyPr>
-          <a:lstStyle/>
-          <a:p>
-            <a:pPr lvl="0">
-              <a:spcBef>
-                <a:spcPts val="0"/>
-              </a:spcBef>
-              <a:buNone/>
-            </a:pPr>
-            <a:r>
-              <a:t/>
-            </a:r>
-            <a:endParaRPr/>
-          </a:p>
-        </p:txBody>
-      </p:sp>
-      <p:sp>
-        <p:nvSpPr>
-          <p:cNvPr id="588" name="Shape 588"/>
+          <p:cNvPr id="586" name="Shape 586"/>
           <p:cNvSpPr/>
           <p:nvPr>
             <p:ph idx="2" type="sldImg"/>
@@ -4572,7 +4537,7 @@
         <p:spPr>
           <a:xfrm>
             <a:off x="1158875" y="692150"/>
-            <a:ext cx="4616450" cy="3462337"/>
+            <a:ext cx="4616400" cy="3462300"/>
           </a:xfrm>
           <a:custGeom>
             <a:pathLst>
@@ -4594,6 +4559,83 @@
             </a:pathLst>
           </a:custGeom>
         </p:spPr>
+      </p:sp>
+      <p:sp>
+        <p:nvSpPr>
+          <p:cNvPr id="587" name="Shape 587"/>
+          <p:cNvSpPr txBox="1"/>
+          <p:nvPr>
+            <p:ph idx="1" type="body"/>
+          </p:nvPr>
+        </p:nvSpPr>
+        <p:spPr>
+          <a:xfrm>
+            <a:off x="923925" y="4386262"/>
+            <a:ext cx="5086200" cy="4154400"/>
+          </a:xfrm>
+          <a:prstGeom prst="rect">
+            <a:avLst/>
+          </a:prstGeom>
+        </p:spPr>
+        <p:txBody>
+          <a:bodyPr anchorCtr="0" anchor="t" bIns="91425" lIns="91425" rIns="91425" wrap="square" tIns="91425">
+            <a:noAutofit/>
+          </a:bodyPr>
+          <a:lstStyle/>
+          <a:p>
+            <a:pPr lvl="0">
+              <a:spcBef>
+                <a:spcPts val="0"/>
+              </a:spcBef>
+              <a:buNone/>
+            </a:pPr>
+            <a:r>
+              <a:t/>
+            </a:r>
+            <a:endParaRPr/>
+          </a:p>
+        </p:txBody>
+      </p:sp>
+      <p:sp>
+        <p:nvSpPr>
+          <p:cNvPr id="588" name="Shape 588"/>
+          <p:cNvSpPr txBox="1"/>
+          <p:nvPr>
+            <p:ph idx="12" type="sldNum"/>
+          </p:nvPr>
+        </p:nvSpPr>
+        <p:spPr>
+          <a:xfrm>
+            <a:off x="3929062" y="8770937"/>
+            <a:ext cx="3005100" cy="462000"/>
+          </a:xfrm>
+          <a:prstGeom prst="rect">
+            <a:avLst/>
+          </a:prstGeom>
+        </p:spPr>
+        <p:txBody>
+          <a:bodyPr anchorCtr="0" anchor="b" bIns="46175" lIns="92375" rIns="92375" wrap="square" tIns="46175">
+            <a:noAutofit/>
+          </a:bodyPr>
+          <a:lstStyle/>
+          <a:p>
+            <a:pPr lvl="0">
+              <a:spcBef>
+                <a:spcPts val="0"/>
+              </a:spcBef>
+              <a:buClr>
+                <a:srgbClr val="000000"/>
+              </a:buClr>
+              <a:buSzPct val="25000"/>
+              <a:buFont typeface="Arial"/>
+              <a:buNone/>
+            </a:pPr>
+            <a:fld id="{00000000-1234-1234-1234-123412341234}" type="slidenum">
+              <a:rPr lang="en-US"/>
+              <a:t>‹#›</a:t>
+            </a:fld>
+          </a:p>
+        </p:txBody>
       </p:sp>
     </p:spTree>
   </p:cSld>
@@ -4703,7 +4745,7 @@
   <p:cSld>
     <p:spTree>
       <p:nvGrpSpPr>
-        <p:cNvPr id="603" name="Shape 603"/>
+        <p:cNvPr id="602" name="Shape 602"/>
         <p:cNvGrpSpPr/>
         <p:nvPr/>
       </p:nvGrpSpPr>
@@ -4717,6 +4759,42 @@
       </p:grpSpPr>
       <p:sp>
         <p:nvSpPr>
+          <p:cNvPr id="603" name="Shape 603"/>
+          <p:cNvSpPr txBox="1"/>
+          <p:nvPr>
+            <p:ph idx="1" type="body"/>
+          </p:nvPr>
+        </p:nvSpPr>
+        <p:spPr>
+          <a:xfrm>
+            <a:off x="923925" y="4386262"/>
+            <a:ext cx="5086350" cy="4154487"/>
+          </a:xfrm>
+          <a:prstGeom prst="rect">
+            <a:avLst/>
+          </a:prstGeom>
+        </p:spPr>
+        <p:txBody>
+          <a:bodyPr anchorCtr="0" anchor="t" bIns="91425" lIns="91425" rIns="91425" wrap="square" tIns="91425">
+            <a:noAutofit/>
+          </a:bodyPr>
+          <a:lstStyle/>
+          <a:p>
+            <a:pPr lvl="0">
+              <a:spcBef>
+                <a:spcPts val="0"/>
+              </a:spcBef>
+              <a:buNone/>
+            </a:pPr>
+            <a:r>
+              <a:t/>
+            </a:r>
+            <a:endParaRPr/>
+          </a:p>
+        </p:txBody>
+      </p:sp>
+      <p:sp>
+        <p:nvSpPr>
           <p:cNvPr id="604" name="Shape 604"/>
           <p:cNvSpPr/>
           <p:nvPr>
@@ -4726,7 +4804,7 @@
         <p:spPr>
           <a:xfrm>
             <a:off x="1158875" y="692150"/>
-            <a:ext cx="4616400" cy="3462300"/>
+            <a:ext cx="4616450" cy="3462337"/>
           </a:xfrm>
           <a:custGeom>
             <a:pathLst>
@@ -4748,83 +4826,6 @@
             </a:pathLst>
           </a:custGeom>
         </p:spPr>
-      </p:sp>
-      <p:sp>
-        <p:nvSpPr>
-          <p:cNvPr id="605" name="Shape 605"/>
-          <p:cNvSpPr txBox="1"/>
-          <p:nvPr>
-            <p:ph idx="1" type="body"/>
-          </p:nvPr>
-        </p:nvSpPr>
-        <p:spPr>
-          <a:xfrm>
-            <a:off x="923925" y="4386262"/>
-            <a:ext cx="5086200" cy="4154400"/>
-          </a:xfrm>
-          <a:prstGeom prst="rect">
-            <a:avLst/>
-          </a:prstGeom>
-        </p:spPr>
-        <p:txBody>
-          <a:bodyPr anchorCtr="0" anchor="t" bIns="91425" lIns="91425" rIns="91425" wrap="square" tIns="91425">
-            <a:noAutofit/>
-          </a:bodyPr>
-          <a:lstStyle/>
-          <a:p>
-            <a:pPr lvl="0" rtl="0">
-              <a:spcBef>
-                <a:spcPts val="0"/>
-              </a:spcBef>
-              <a:buNone/>
-            </a:pPr>
-            <a:r>
-              <a:t/>
-            </a:r>
-            <a:endParaRPr/>
-          </a:p>
-        </p:txBody>
-      </p:sp>
-      <p:sp>
-        <p:nvSpPr>
-          <p:cNvPr id="606" name="Shape 606"/>
-          <p:cNvSpPr txBox="1"/>
-          <p:nvPr>
-            <p:ph idx="12" type="sldNum"/>
-          </p:nvPr>
-        </p:nvSpPr>
-        <p:spPr>
-          <a:xfrm>
-            <a:off x="3929062" y="8770937"/>
-            <a:ext cx="3005100" cy="462000"/>
-          </a:xfrm>
-          <a:prstGeom prst="rect">
-            <a:avLst/>
-          </a:prstGeom>
-        </p:spPr>
-        <p:txBody>
-          <a:bodyPr anchorCtr="0" anchor="b" bIns="46175" lIns="92375" rIns="92375" wrap="square" tIns="46175">
-            <a:noAutofit/>
-          </a:bodyPr>
-          <a:lstStyle/>
-          <a:p>
-            <a:pPr lvl="0" rtl="0">
-              <a:spcBef>
-                <a:spcPts val="0"/>
-              </a:spcBef>
-              <a:buClr>
-                <a:srgbClr val="000000"/>
-              </a:buClr>
-              <a:buSzPct val="25000"/>
-              <a:buFont typeface="Arial"/>
-              <a:buNone/>
-            </a:pPr>
-            <a:fld id="{00000000-1234-1234-1234-123412341234}" type="slidenum">
-              <a:rPr lang="en-US"/>
-              <a:t>‹#›</a:t>
-            </a:fld>
-          </a:p>
-        </p:txBody>
       </p:sp>
     </p:spTree>
   </p:cSld>
@@ -4934,7 +4935,7 @@
   <p:cSld>
     <p:spTree>
       <p:nvGrpSpPr>
-        <p:cNvPr id="610" name="Shape 610"/>
+        <p:cNvPr id="611" name="Shape 611"/>
         <p:cNvGrpSpPr/>
         <p:nvPr/>
       </p:nvGrpSpPr>
@@ -4948,7 +4949,7 @@
       </p:grpSpPr>
       <p:sp>
         <p:nvSpPr>
-          <p:cNvPr id="611" name="Shape 611"/>
+          <p:cNvPr id="612" name="Shape 612"/>
           <p:cNvSpPr/>
           <p:nvPr>
             <p:ph idx="2" type="sldImg"/>
@@ -4982,7 +4983,7 @@
       </p:sp>
       <p:sp>
         <p:nvSpPr>
-          <p:cNvPr id="612" name="Shape 612"/>
+          <p:cNvPr id="613" name="Shape 613"/>
           <p:cNvSpPr txBox="1"/>
           <p:nvPr>
             <p:ph idx="1" type="body"/>
@@ -5018,7 +5019,7 @@
       </p:sp>
       <p:sp>
         <p:nvSpPr>
-          <p:cNvPr id="613" name="Shape 613"/>
+          <p:cNvPr id="614" name="Shape 614"/>
           <p:cNvSpPr txBox="1"/>
           <p:nvPr>
             <p:ph idx="12" type="sldNum"/>
@@ -5070,7 +5071,7 @@
   <p:cSld>
     <p:spTree>
       <p:nvGrpSpPr>
-        <p:cNvPr id="617" name="Shape 617"/>
+        <p:cNvPr id="618" name="Shape 618"/>
         <p:cNvGrpSpPr/>
         <p:nvPr/>
       </p:nvGrpSpPr>
@@ -5084,42 +5085,6 @@
       </p:grpSpPr>
       <p:sp>
         <p:nvSpPr>
-          <p:cNvPr id="618" name="Shape 618"/>
-          <p:cNvSpPr txBox="1"/>
-          <p:nvPr>
-            <p:ph idx="1" type="body"/>
-          </p:nvPr>
-        </p:nvSpPr>
-        <p:spPr>
-          <a:xfrm>
-            <a:off x="923925" y="4386262"/>
-            <a:ext cx="5086350" cy="4154487"/>
-          </a:xfrm>
-          <a:prstGeom prst="rect">
-            <a:avLst/>
-          </a:prstGeom>
-        </p:spPr>
-        <p:txBody>
-          <a:bodyPr anchorCtr="0" anchor="t" bIns="91425" lIns="91425" rIns="91425" wrap="square" tIns="91425">
-            <a:noAutofit/>
-          </a:bodyPr>
-          <a:lstStyle/>
-          <a:p>
-            <a:pPr lvl="0">
-              <a:spcBef>
-                <a:spcPts val="0"/>
-              </a:spcBef>
-              <a:buNone/>
-            </a:pPr>
-            <a:r>
-              <a:t/>
-            </a:r>
-            <a:endParaRPr/>
-          </a:p>
-        </p:txBody>
-      </p:sp>
-      <p:sp>
-        <p:nvSpPr>
           <p:cNvPr id="619" name="Shape 619"/>
           <p:cNvSpPr/>
           <p:nvPr>
@@ -5129,7 +5094,7 @@
         <p:spPr>
           <a:xfrm>
             <a:off x="1158875" y="692150"/>
-            <a:ext cx="4616450" cy="3462337"/>
+            <a:ext cx="4616400" cy="3462300"/>
           </a:xfrm>
           <a:custGeom>
             <a:pathLst>
@@ -5152,6 +5117,83 @@
           </a:custGeom>
         </p:spPr>
       </p:sp>
+      <p:sp>
+        <p:nvSpPr>
+          <p:cNvPr id="620" name="Shape 620"/>
+          <p:cNvSpPr txBox="1"/>
+          <p:nvPr>
+            <p:ph idx="1" type="body"/>
+          </p:nvPr>
+        </p:nvSpPr>
+        <p:spPr>
+          <a:xfrm>
+            <a:off x="923925" y="4386262"/>
+            <a:ext cx="5086200" cy="4154400"/>
+          </a:xfrm>
+          <a:prstGeom prst="rect">
+            <a:avLst/>
+          </a:prstGeom>
+        </p:spPr>
+        <p:txBody>
+          <a:bodyPr anchorCtr="0" anchor="t" bIns="91425" lIns="91425" rIns="91425" wrap="square" tIns="91425">
+            <a:noAutofit/>
+          </a:bodyPr>
+          <a:lstStyle/>
+          <a:p>
+            <a:pPr lvl="0" rtl="0">
+              <a:spcBef>
+                <a:spcPts val="0"/>
+              </a:spcBef>
+              <a:buNone/>
+            </a:pPr>
+            <a:r>
+              <a:t/>
+            </a:r>
+            <a:endParaRPr/>
+          </a:p>
+        </p:txBody>
+      </p:sp>
+      <p:sp>
+        <p:nvSpPr>
+          <p:cNvPr id="621" name="Shape 621"/>
+          <p:cNvSpPr txBox="1"/>
+          <p:nvPr>
+            <p:ph idx="12" type="sldNum"/>
+          </p:nvPr>
+        </p:nvSpPr>
+        <p:spPr>
+          <a:xfrm>
+            <a:off x="3929062" y="8770937"/>
+            <a:ext cx="3005100" cy="462000"/>
+          </a:xfrm>
+          <a:prstGeom prst="rect">
+            <a:avLst/>
+          </a:prstGeom>
+        </p:spPr>
+        <p:txBody>
+          <a:bodyPr anchorCtr="0" anchor="b" bIns="46175" lIns="92375" rIns="92375" wrap="square" tIns="46175">
+            <a:noAutofit/>
+          </a:bodyPr>
+          <a:lstStyle/>
+          <a:p>
+            <a:pPr lvl="0" rtl="0">
+              <a:spcBef>
+                <a:spcPts val="0"/>
+              </a:spcBef>
+              <a:buClr>
+                <a:srgbClr val="000000"/>
+              </a:buClr>
+              <a:buSzPct val="25000"/>
+              <a:buFont typeface="Arial"/>
+              <a:buNone/>
+            </a:pPr>
+            <a:fld id="{00000000-1234-1234-1234-123412341234}" type="slidenum">
+              <a:rPr lang="en-US"/>
+              <a:t>‹#›</a:t>
+            </a:fld>
+          </a:p>
+        </p:txBody>
+      </p:sp>
     </p:spTree>
   </p:cSld>
   <p:clrMapOvr>
@@ -5165,7 +5207,7 @@
   <p:cSld>
     <p:spTree>
       <p:nvGrpSpPr>
-        <p:cNvPr id="624" name="Shape 624"/>
+        <p:cNvPr id="625" name="Shape 625"/>
         <p:cNvGrpSpPr/>
         <p:nvPr/>
       </p:nvGrpSpPr>
@@ -5179,7 +5221,43 @@
       </p:grpSpPr>
       <p:sp>
         <p:nvSpPr>
-          <p:cNvPr id="625" name="Shape 625"/>
+          <p:cNvPr id="626" name="Shape 626"/>
+          <p:cNvSpPr txBox="1"/>
+          <p:nvPr>
+            <p:ph idx="1" type="body"/>
+          </p:nvPr>
+        </p:nvSpPr>
+        <p:spPr>
+          <a:xfrm>
+            <a:off x="923925" y="4386262"/>
+            <a:ext cx="5086350" cy="4154487"/>
+          </a:xfrm>
+          <a:prstGeom prst="rect">
+            <a:avLst/>
+          </a:prstGeom>
+        </p:spPr>
+        <p:txBody>
+          <a:bodyPr anchorCtr="0" anchor="t" bIns="91425" lIns="91425" rIns="91425" wrap="square" tIns="91425">
+            <a:noAutofit/>
+          </a:bodyPr>
+          <a:lstStyle/>
+          <a:p>
+            <a:pPr lvl="0">
+              <a:spcBef>
+                <a:spcPts val="0"/>
+              </a:spcBef>
+              <a:buNone/>
+            </a:pPr>
+            <a:r>
+              <a:t/>
+            </a:r>
+            <a:endParaRPr/>
+          </a:p>
+        </p:txBody>
+      </p:sp>
+      <p:sp>
+        <p:nvSpPr>
+          <p:cNvPr id="627" name="Shape 627"/>
           <p:cNvSpPr/>
           <p:nvPr>
             <p:ph idx="2" type="sldImg"/>
@@ -5188,7 +5266,7 @@
         <p:spPr>
           <a:xfrm>
             <a:off x="1158875" y="692150"/>
-            <a:ext cx="4616400" cy="3462300"/>
+            <a:ext cx="4616450" cy="3462337"/>
           </a:xfrm>
           <a:custGeom>
             <a:pathLst>
@@ -5211,83 +5289,6 @@
           </a:custGeom>
         </p:spPr>
       </p:sp>
-      <p:sp>
-        <p:nvSpPr>
-          <p:cNvPr id="626" name="Shape 626"/>
-          <p:cNvSpPr txBox="1"/>
-          <p:nvPr>
-            <p:ph idx="1" type="body"/>
-          </p:nvPr>
-        </p:nvSpPr>
-        <p:spPr>
-          <a:xfrm>
-            <a:off x="923925" y="4386262"/>
-            <a:ext cx="5086200" cy="4154400"/>
-          </a:xfrm>
-          <a:prstGeom prst="rect">
-            <a:avLst/>
-          </a:prstGeom>
-        </p:spPr>
-        <p:txBody>
-          <a:bodyPr anchorCtr="0" anchor="t" bIns="91425" lIns="91425" rIns="91425" wrap="square" tIns="91425">
-            <a:noAutofit/>
-          </a:bodyPr>
-          <a:lstStyle/>
-          <a:p>
-            <a:pPr lvl="0">
-              <a:spcBef>
-                <a:spcPts val="0"/>
-              </a:spcBef>
-              <a:buNone/>
-            </a:pPr>
-            <a:r>
-              <a:t/>
-            </a:r>
-            <a:endParaRPr/>
-          </a:p>
-        </p:txBody>
-      </p:sp>
-      <p:sp>
-        <p:nvSpPr>
-          <p:cNvPr id="627" name="Shape 627"/>
-          <p:cNvSpPr txBox="1"/>
-          <p:nvPr>
-            <p:ph idx="12" type="sldNum"/>
-          </p:nvPr>
-        </p:nvSpPr>
-        <p:spPr>
-          <a:xfrm>
-            <a:off x="3929062" y="8770937"/>
-            <a:ext cx="3005100" cy="462000"/>
-          </a:xfrm>
-          <a:prstGeom prst="rect">
-            <a:avLst/>
-          </a:prstGeom>
-        </p:spPr>
-        <p:txBody>
-          <a:bodyPr anchorCtr="0" anchor="b" bIns="46175" lIns="92375" rIns="92375" wrap="square" tIns="46175">
-            <a:noAutofit/>
-          </a:bodyPr>
-          <a:lstStyle/>
-          <a:p>
-            <a:pPr lvl="0">
-              <a:spcBef>
-                <a:spcPts val="0"/>
-              </a:spcBef>
-              <a:buClr>
-                <a:srgbClr val="000000"/>
-              </a:buClr>
-              <a:buSzPct val="25000"/>
-              <a:buFont typeface="Arial"/>
-              <a:buNone/>
-            </a:pPr>
-            <a:fld id="{00000000-1234-1234-1234-123412341234}" type="slidenum">
-              <a:rPr lang="en-US"/>
-              <a:t>‹#›</a:t>
-            </a:fld>
-          </a:p>
-        </p:txBody>
-      </p:sp>
     </p:spTree>
   </p:cSld>
   <p:clrMapOvr>
@@ -5301,7 +5302,7 @@
   <p:cSld>
     <p:spTree>
       <p:nvGrpSpPr>
-        <p:cNvPr id="631" name="Shape 631"/>
+        <p:cNvPr id="632" name="Shape 632"/>
         <p:cNvGrpSpPr/>
         <p:nvPr/>
       </p:nvGrpSpPr>
@@ -5315,7 +5316,7 @@
       </p:grpSpPr>
       <p:sp>
         <p:nvSpPr>
-          <p:cNvPr id="632" name="Shape 632"/>
+          <p:cNvPr id="633" name="Shape 633"/>
           <p:cNvSpPr/>
           <p:nvPr>
             <p:ph idx="2" type="sldImg"/>
@@ -5349,7 +5350,7 @@
       </p:sp>
       <p:sp>
         <p:nvSpPr>
-          <p:cNvPr id="633" name="Shape 633"/>
+          <p:cNvPr id="634" name="Shape 634"/>
           <p:cNvSpPr txBox="1"/>
           <p:nvPr>
             <p:ph idx="1" type="body"/>
@@ -5385,7 +5386,7 @@
       </p:sp>
       <p:sp>
         <p:nvSpPr>
-          <p:cNvPr id="634" name="Shape 634"/>
+          <p:cNvPr id="635" name="Shape 635"/>
           <p:cNvSpPr txBox="1"/>
           <p:nvPr>
             <p:ph idx="12" type="sldNum"/>
@@ -5573,7 +5574,7 @@
   <p:cSld>
     <p:spTree>
       <p:nvGrpSpPr>
-        <p:cNvPr id="646" name="Shape 646"/>
+        <p:cNvPr id="647" name="Shape 647"/>
         <p:cNvGrpSpPr/>
         <p:nvPr/>
       </p:nvGrpSpPr>
@@ -5587,7 +5588,7 @@
       </p:grpSpPr>
       <p:sp>
         <p:nvSpPr>
-          <p:cNvPr id="647" name="Shape 647"/>
+          <p:cNvPr id="648" name="Shape 648"/>
           <p:cNvSpPr/>
           <p:nvPr>
             <p:ph idx="2" type="sldImg"/>
@@ -5621,7 +5622,7 @@
       </p:sp>
       <p:sp>
         <p:nvSpPr>
-          <p:cNvPr id="648" name="Shape 648"/>
+          <p:cNvPr id="649" name="Shape 649"/>
           <p:cNvSpPr txBox="1"/>
           <p:nvPr>
             <p:ph idx="1" type="body"/>
@@ -5657,7 +5658,7 @@
       </p:sp>
       <p:sp>
         <p:nvSpPr>
-          <p:cNvPr id="649" name="Shape 649"/>
+          <p:cNvPr id="650" name="Shape 650"/>
           <p:cNvSpPr txBox="1"/>
           <p:nvPr>
             <p:ph idx="12" type="sldNum"/>
@@ -5709,7 +5710,7 @@
   <p:cSld>
     <p:spTree>
       <p:nvGrpSpPr>
-        <p:cNvPr id="653" name="Shape 653"/>
+        <p:cNvPr id="654" name="Shape 654"/>
         <p:cNvGrpSpPr/>
         <p:nvPr/>
       </p:nvGrpSpPr>
@@ -5723,7 +5724,7 @@
       </p:grpSpPr>
       <p:sp>
         <p:nvSpPr>
-          <p:cNvPr id="654" name="Shape 654"/>
+          <p:cNvPr id="655" name="Shape 655"/>
           <p:cNvSpPr/>
           <p:nvPr>
             <p:ph idx="2" type="sldImg"/>
@@ -5757,7 +5758,7 @@
       </p:sp>
       <p:sp>
         <p:nvSpPr>
-          <p:cNvPr id="655" name="Shape 655"/>
+          <p:cNvPr id="656" name="Shape 656"/>
           <p:cNvSpPr txBox="1"/>
           <p:nvPr>
             <p:ph idx="1" type="body"/>
@@ -5793,7 +5794,7 @@
       </p:sp>
       <p:sp>
         <p:nvSpPr>
-          <p:cNvPr id="656" name="Shape 656"/>
+          <p:cNvPr id="657" name="Shape 657"/>
           <p:cNvSpPr txBox="1"/>
           <p:nvPr>
             <p:ph idx="12" type="sldNum"/>
@@ -6404,6 +6405,40 @@
       <p:sp>
         <p:nvSpPr>
           <p:cNvPr id="686" name="Shape 686"/>
+          <p:cNvSpPr/>
+          <p:nvPr>
+            <p:ph idx="2" type="sldImg"/>
+          </p:nvPr>
+        </p:nvSpPr>
+        <p:spPr>
+          <a:xfrm>
+            <a:off x="1158875" y="692150"/>
+            <a:ext cx="4616400" cy="3462300"/>
+          </a:xfrm>
+          <a:custGeom>
+            <a:pathLst>
+              <a:path extrusionOk="0" h="120000" w="120000">
+                <a:moveTo>
+                  <a:pt x="0" y="0"/>
+                </a:moveTo>
+                <a:lnTo>
+                  <a:pt x="120000" y="0"/>
+                </a:lnTo>
+                <a:lnTo>
+                  <a:pt x="120000" y="120000"/>
+                </a:lnTo>
+                <a:lnTo>
+                  <a:pt x="0" y="120000"/>
+                </a:lnTo>
+                <a:close/>
+              </a:path>
+            </a:pathLst>
+          </a:custGeom>
+        </p:spPr>
+      </p:sp>
+      <p:sp>
+        <p:nvSpPr>
+          <p:cNvPr id="687" name="Shape 687"/>
           <p:cNvSpPr txBox="1"/>
           <p:nvPr>
             <p:ph idx="1" type="body"/>
@@ -6412,6 +6447,108 @@
         <p:spPr>
           <a:xfrm>
             <a:off x="923925" y="4386262"/>
+            <a:ext cx="5086200" cy="4154400"/>
+          </a:xfrm>
+          <a:prstGeom prst="rect">
+            <a:avLst/>
+          </a:prstGeom>
+        </p:spPr>
+        <p:txBody>
+          <a:bodyPr anchorCtr="0" anchor="t" bIns="91425" lIns="91425" rIns="91425" wrap="square" tIns="91425">
+            <a:noAutofit/>
+          </a:bodyPr>
+          <a:lstStyle/>
+          <a:p>
+            <a:pPr lvl="0">
+              <a:spcBef>
+                <a:spcPts val="0"/>
+              </a:spcBef>
+              <a:buNone/>
+            </a:pPr>
+            <a:r>
+              <a:t/>
+            </a:r>
+            <a:endParaRPr/>
+          </a:p>
+        </p:txBody>
+      </p:sp>
+      <p:sp>
+        <p:nvSpPr>
+          <p:cNvPr id="688" name="Shape 688"/>
+          <p:cNvSpPr txBox="1"/>
+          <p:nvPr>
+            <p:ph idx="12" type="sldNum"/>
+          </p:nvPr>
+        </p:nvSpPr>
+        <p:spPr>
+          <a:xfrm>
+            <a:off x="3929062" y="8770937"/>
+            <a:ext cx="3005100" cy="462000"/>
+          </a:xfrm>
+          <a:prstGeom prst="rect">
+            <a:avLst/>
+          </a:prstGeom>
+        </p:spPr>
+        <p:txBody>
+          <a:bodyPr anchorCtr="0" anchor="b" bIns="46175" lIns="92375" rIns="92375" wrap="square" tIns="46175">
+            <a:noAutofit/>
+          </a:bodyPr>
+          <a:lstStyle/>
+          <a:p>
+            <a:pPr lvl="0">
+              <a:spcBef>
+                <a:spcPts val="0"/>
+              </a:spcBef>
+              <a:buClr>
+                <a:srgbClr val="000000"/>
+              </a:buClr>
+              <a:buSzPct val="25000"/>
+              <a:buFont typeface="Arial"/>
+              <a:buNone/>
+            </a:pPr>
+            <a:fld id="{00000000-1234-1234-1234-123412341234}" type="slidenum">
+              <a:rPr lang="en-US"/>
+              <a:t>‹#›</a:t>
+            </a:fld>
+          </a:p>
+        </p:txBody>
+      </p:sp>
+    </p:spTree>
+  </p:cSld>
+  <p:clrMapOvr>
+    <a:masterClrMapping/>
+  </p:clrMapOvr>
+</p:notes>
+</file>
+
+<file path=ppt/notesSlides/notesSlide51.xml><?xml version="1.0" encoding="utf-8"?>
+<p:notes xmlns:a="http://schemas.openxmlformats.org/drawingml/2006/main" xmlns:r="http://schemas.openxmlformats.org/officeDocument/2006/relationships" xmlns:mc="http://schemas.openxmlformats.org/markup-compatibility/2006" xmlns:mv="urn:schemas-microsoft-com:mac:vml" xmlns:p="http://schemas.openxmlformats.org/presentationml/2006/main" xmlns:c="http://schemas.openxmlformats.org/drawingml/2006/chart" xmlns:dgm="http://schemas.openxmlformats.org/drawingml/2006/diagram" xmlns:o="urn:schemas-microsoft-com:office:office" xmlns:v="urn:schemas-microsoft-com:vml" xmlns:pvml="urn:schemas-microsoft-com:office:powerpoint" xmlns:com="http://schemas.openxmlformats.org/drawingml/2006/compatibility" xmlns:p14="http://schemas.microsoft.com/office/powerpoint/2010/main" xmlns:p15="http://schemas.microsoft.com/office/powerpoint/2012/main" showMasterPhAnim="0" showMasterSp="0">
+  <p:cSld>
+    <p:spTree>
+      <p:nvGrpSpPr>
+        <p:cNvPr id="693" name="Shape 693"/>
+        <p:cNvGrpSpPr/>
+        <p:nvPr/>
+      </p:nvGrpSpPr>
+      <p:grpSpPr>
+        <a:xfrm>
+          <a:off x="0" y="0"/>
+          <a:ext cx="0" cy="0"/>
+          <a:chOff x="0" y="0"/>
+          <a:chExt cx="0" cy="0"/>
+        </a:xfrm>
+      </p:grpSpPr>
+      <p:sp>
+        <p:nvSpPr>
+          <p:cNvPr id="694" name="Shape 694"/>
+          <p:cNvSpPr txBox="1"/>
+          <p:nvPr>
+            <p:ph idx="1" type="body"/>
+          </p:nvPr>
+        </p:nvSpPr>
+        <p:spPr>
+          <a:xfrm>
+            <a:off x="923925" y="4386262"/>
             <a:ext cx="5086350" cy="4154487"/>
           </a:xfrm>
           <a:prstGeom prst="rect">
@@ -6439,7 +6576,7 @@
       </p:sp>
       <p:sp>
         <p:nvSpPr>
-          <p:cNvPr id="687" name="Shape 687"/>
+          <p:cNvPr id="695" name="Shape 695"/>
           <p:cNvSpPr/>
           <p:nvPr>
             <p:ph idx="2" type="sldImg"/>
@@ -29018,7 +29155,7 @@
   <p:cSld>
     <p:spTree>
       <p:nvGrpSpPr>
-        <p:cNvPr id="572" name="Shape 572"/>
+        <p:cNvPr id="573" name="Shape 573"/>
         <p:cNvGrpSpPr/>
         <p:nvPr/>
       </p:nvGrpSpPr>
@@ -29032,7 +29169,137 @@
       </p:grpSpPr>
       <p:sp>
         <p:nvSpPr>
-          <p:cNvPr id="573" name="Shape 573"/>
+          <p:cNvPr id="574" name="Shape 574"/>
+          <p:cNvSpPr txBox="1"/>
+          <p:nvPr>
+            <p:ph type="title"/>
+          </p:nvPr>
+        </p:nvSpPr>
+        <p:spPr>
+          <a:xfrm>
+            <a:off x="0" y="149800"/>
+            <a:ext cx="9144000" cy="758700"/>
+          </a:xfrm>
+          <a:prstGeom prst="rect">
+            <a:avLst/>
+          </a:prstGeom>
+        </p:spPr>
+        <p:txBody>
+          <a:bodyPr anchorCtr="0" anchor="t" bIns="91425" lIns="91425" rIns="91425" wrap="square" tIns="91425">
+            <a:noAutofit/>
+          </a:bodyPr>
+          <a:lstStyle/>
+          <a:p>
+            <a:pPr lvl="0">
+              <a:spcBef>
+                <a:spcPts val="0"/>
+              </a:spcBef>
+              <a:buNone/>
+            </a:pPr>
+            <a:r>
+              <a:rPr lang="en-US"/>
+              <a:t>Best practices - concise commit messages</a:t>
+            </a:r>
+          </a:p>
+        </p:txBody>
+      </p:sp>
+      <p:sp>
+        <p:nvSpPr>
+          <p:cNvPr id="575" name="Shape 575"/>
+          <p:cNvSpPr txBox="1"/>
+          <p:nvPr>
+            <p:ph idx="12" type="sldNum"/>
+          </p:nvPr>
+        </p:nvSpPr>
+        <p:spPr>
+          <a:xfrm>
+            <a:off x="8077200" y="6553200"/>
+            <a:ext cx="838200" cy="228600"/>
+          </a:xfrm>
+          <a:prstGeom prst="rect">
+            <a:avLst/>
+          </a:prstGeom>
+        </p:spPr>
+        <p:txBody>
+          <a:bodyPr anchorCtr="0" anchor="t" bIns="45700" lIns="91425" rIns="91425" wrap="square" tIns="45700">
+            <a:noAutofit/>
+          </a:bodyPr>
+          <a:lstStyle/>
+          <a:p>
+            <a:pPr lvl="0">
+              <a:spcBef>
+                <a:spcPts val="0"/>
+              </a:spcBef>
+              <a:buClr>
+                <a:schemeClr val="lt2"/>
+              </a:buClr>
+              <a:buSzPct val="25000"/>
+              <a:buFont typeface="Arial"/>
+              <a:buNone/>
+            </a:pPr>
+            <a:fld id="{00000000-1234-1234-1234-123412341234}" type="slidenum">
+              <a:rPr lang="en-US"/>
+              <a:t>‹#›</a:t>
+            </a:fld>
+          </a:p>
+        </p:txBody>
+      </p:sp>
+      <p:pic>
+        <p:nvPicPr>
+          <p:cNvPr descr="commit_message_header.png" id="576" name="Shape 576"/>
+          <p:cNvPicPr preferRelativeResize="0"/>
+          <p:nvPr/>
+        </p:nvPicPr>
+        <p:blipFill>
+          <a:blip r:embed="rId3">
+            <a:alphaModFix/>
+          </a:blip>
+          <a:stretch>
+            <a:fillRect/>
+          </a:stretch>
+        </p:blipFill>
+        <p:spPr>
+          <a:xfrm>
+            <a:off x="0" y="1714500"/>
+            <a:ext cx="9144000" cy="3961925"/>
+          </a:xfrm>
+          <a:prstGeom prst="rect">
+            <a:avLst/>
+          </a:prstGeom>
+          <a:noFill/>
+          <a:ln>
+            <a:noFill/>
+          </a:ln>
+        </p:spPr>
+      </p:pic>
+    </p:spTree>
+  </p:cSld>
+  <p:clrMapOvr>
+    <a:masterClrMapping/>
+  </p:clrMapOvr>
+</p:sld>
+</file>
+
+<file path=ppt/slides/slide36.xml><?xml version="1.0" encoding="utf-8"?>
+<p:sld xmlns:a="http://schemas.openxmlformats.org/drawingml/2006/main" xmlns:r="http://schemas.openxmlformats.org/officeDocument/2006/relationships" xmlns:mc="http://schemas.openxmlformats.org/markup-compatibility/2006" xmlns:mv="urn:schemas-microsoft-com:mac:vml" xmlns:p="http://schemas.openxmlformats.org/presentationml/2006/main" xmlns:c="http://schemas.openxmlformats.org/drawingml/2006/chart" xmlns:dgm="http://schemas.openxmlformats.org/drawingml/2006/diagram" xmlns:o="urn:schemas-microsoft-com:office:office" xmlns:v="urn:schemas-microsoft-com:vml" xmlns:pvml="urn:schemas-microsoft-com:office:powerpoint" xmlns:com="http://schemas.openxmlformats.org/drawingml/2006/compatibility" xmlns:p14="http://schemas.microsoft.com/office/powerpoint/2010/main" xmlns:p15="http://schemas.microsoft.com/office/powerpoint/2012/main">
+  <p:cSld>
+    <p:spTree>
+      <p:nvGrpSpPr>
+        <p:cNvPr id="580" name="Shape 580"/>
+        <p:cNvGrpSpPr/>
+        <p:nvPr/>
+      </p:nvGrpSpPr>
+      <p:grpSpPr>
+        <a:xfrm>
+          <a:off x="0" y="0"/>
+          <a:ext cx="0" cy="0"/>
+          <a:chOff x="0" y="0"/>
+          <a:chExt cx="0" cy="0"/>
+        </a:xfrm>
+      </p:grpSpPr>
+      <p:sp>
+        <p:nvSpPr>
+          <p:cNvPr id="581" name="Shape 581"/>
           <p:cNvSpPr txBox="1"/>
           <p:nvPr>
             <p:ph type="title"/>
@@ -29113,7 +29380,7 @@
       </p:sp>
       <p:sp>
         <p:nvSpPr>
-          <p:cNvPr id="574" name="Shape 574"/>
+          <p:cNvPr id="582" name="Shape 582"/>
           <p:cNvSpPr txBox="1"/>
           <p:nvPr/>
         </p:nvSpPr>
@@ -29170,7 +29437,7 @@
       </p:sp>
       <p:sp>
         <p:nvSpPr>
-          <p:cNvPr id="575" name="Shape 575"/>
+          <p:cNvPr id="583" name="Shape 583"/>
           <p:cNvSpPr txBox="1"/>
           <p:nvPr/>
         </p:nvSpPr>
@@ -29227,7 +29494,7 @@
       </p:sp>
       <p:pic>
         <p:nvPicPr>
-          <p:cNvPr id="576" name="Shape 576"/>
+          <p:cNvPr id="584" name="Shape 584"/>
           <p:cNvPicPr preferRelativeResize="0"/>
           <p:nvPr>
             <p:ph idx="1" type="body"/>
@@ -29244,180 +29511,6 @@
           <a:xfrm>
             <a:off x="228600" y="1417637"/>
             <a:ext cx="8758237" cy="4678362"/>
-          </a:xfrm>
-          <a:prstGeom prst="rect">
-            <a:avLst/>
-          </a:prstGeom>
-          <a:noFill/>
-          <a:ln>
-            <a:noFill/>
-          </a:ln>
-        </p:spPr>
-      </p:pic>
-    </p:spTree>
-  </p:cSld>
-  <p:clrMapOvr>
-    <a:masterClrMapping/>
-  </p:clrMapOvr>
-</p:sld>
-</file>
-
-<file path=ppt/slides/slide36.xml><?xml version="1.0" encoding="utf-8"?>
-<p:sld xmlns:a="http://schemas.openxmlformats.org/drawingml/2006/main" xmlns:r="http://schemas.openxmlformats.org/officeDocument/2006/relationships" xmlns:mc="http://schemas.openxmlformats.org/markup-compatibility/2006" xmlns:mv="urn:schemas-microsoft-com:mac:vml" xmlns:p="http://schemas.openxmlformats.org/presentationml/2006/main" xmlns:c="http://schemas.openxmlformats.org/drawingml/2006/chart" xmlns:dgm="http://schemas.openxmlformats.org/drawingml/2006/diagram" xmlns:o="urn:schemas-microsoft-com:office:office" xmlns:v="urn:schemas-microsoft-com:vml" xmlns:pvml="urn:schemas-microsoft-com:office:powerpoint" xmlns:com="http://schemas.openxmlformats.org/drawingml/2006/compatibility" xmlns:p14="http://schemas.microsoft.com/office/powerpoint/2010/main" xmlns:p15="http://schemas.microsoft.com/office/powerpoint/2012/main">
-  <p:cSld>
-    <p:spTree>
-      <p:nvGrpSpPr>
-        <p:cNvPr id="581" name="Shape 581"/>
-        <p:cNvGrpSpPr/>
-        <p:nvPr/>
-      </p:nvGrpSpPr>
-      <p:grpSpPr>
-        <a:xfrm>
-          <a:off x="0" y="0"/>
-          <a:ext cx="0" cy="0"/>
-          <a:chOff x="0" y="0"/>
-          <a:chExt cx="0" cy="0"/>
-        </a:xfrm>
-      </p:grpSpPr>
-      <p:sp>
-        <p:nvSpPr>
-          <p:cNvPr id="582" name="Shape 582"/>
-          <p:cNvSpPr txBox="1"/>
-          <p:nvPr>
-            <p:ph type="title"/>
-          </p:nvPr>
-        </p:nvSpPr>
-        <p:spPr>
-          <a:xfrm>
-            <a:off x="12" y="0"/>
-            <a:ext cx="8229600" cy="758700"/>
-          </a:xfrm>
-          <a:prstGeom prst="rect">
-            <a:avLst/>
-          </a:prstGeom>
-        </p:spPr>
-        <p:txBody>
-          <a:bodyPr anchorCtr="0" anchor="t" bIns="91425" lIns="91425" rIns="91425" wrap="square" tIns="91425">
-            <a:noAutofit/>
-          </a:bodyPr>
-          <a:lstStyle/>
-          <a:p>
-            <a:pPr lvl="0">
-              <a:spcBef>
-                <a:spcPts val="0"/>
-              </a:spcBef>
-              <a:buClr>
-                <a:schemeClr val="dk2"/>
-              </a:buClr>
-              <a:buSzPct val="25000"/>
-              <a:buFont typeface="Arial"/>
-              <a:buNone/>
-            </a:pPr>
-            <a:r>
-              <a:rPr lang="en-US"/>
-              <a:t>Best practices – Branch Layout</a:t>
-            </a:r>
-            <a:br>
-              <a:rPr lang="en-US"/>
-            </a:br>
-          </a:p>
-        </p:txBody>
-      </p:sp>
-      <p:sp>
-        <p:nvSpPr>
-          <p:cNvPr id="583" name="Shape 583"/>
-          <p:cNvSpPr txBox="1"/>
-          <p:nvPr>
-            <p:ph idx="1" type="body"/>
-          </p:nvPr>
-        </p:nvSpPr>
-        <p:spPr>
-          <a:xfrm>
-            <a:off x="592137" y="1676400"/>
-            <a:ext cx="8229600" cy="4267200"/>
-          </a:xfrm>
-          <a:prstGeom prst="rect">
-            <a:avLst/>
-          </a:prstGeom>
-        </p:spPr>
-        <p:txBody>
-          <a:bodyPr anchorCtr="0" anchor="t" bIns="91425" lIns="91425" rIns="91425" wrap="square" tIns="91425">
-            <a:noAutofit/>
-          </a:bodyPr>
-          <a:lstStyle/>
-          <a:p>
-            <a:pPr lvl="0">
-              <a:spcBef>
-                <a:spcPts val="0"/>
-              </a:spcBef>
-              <a:buNone/>
-            </a:pPr>
-            <a:r>
-              <a:t/>
-            </a:r>
-            <a:endParaRPr/>
-          </a:p>
-        </p:txBody>
-      </p:sp>
-      <p:sp>
-        <p:nvSpPr>
-          <p:cNvPr id="584" name="Shape 584"/>
-          <p:cNvSpPr txBox="1"/>
-          <p:nvPr>
-            <p:ph idx="12" type="sldNum"/>
-          </p:nvPr>
-        </p:nvSpPr>
-        <p:spPr>
-          <a:xfrm>
-            <a:off x="8077200" y="6553200"/>
-            <a:ext cx="838200" cy="228600"/>
-          </a:xfrm>
-          <a:prstGeom prst="rect">
-            <a:avLst/>
-          </a:prstGeom>
-        </p:spPr>
-        <p:txBody>
-          <a:bodyPr anchorCtr="0" anchor="t" bIns="45700" lIns="91425" rIns="91425" wrap="square" tIns="45700">
-            <a:noAutofit/>
-          </a:bodyPr>
-          <a:lstStyle/>
-          <a:p>
-            <a:pPr lvl="0">
-              <a:spcBef>
-                <a:spcPts val="0"/>
-              </a:spcBef>
-              <a:buClr>
-                <a:schemeClr val="lt2"/>
-              </a:buClr>
-              <a:buSzPct val="25000"/>
-              <a:buFont typeface="Arial"/>
-              <a:buNone/>
-            </a:pPr>
-            <a:fld id="{00000000-1234-1234-1234-123412341234}" type="slidenum">
-              <a:rPr lang="en-US"/>
-              <a:t>‹#›</a:t>
-            </a:fld>
-          </a:p>
-        </p:txBody>
-      </p:sp>
-      <p:pic>
-        <p:nvPicPr>
-          <p:cNvPr id="585" name="Shape 585"/>
-          <p:cNvPicPr preferRelativeResize="0"/>
-          <p:nvPr/>
-        </p:nvPicPr>
-        <p:blipFill>
-          <a:blip r:embed="rId3">
-            <a:alphaModFix/>
-          </a:blip>
-          <a:stretch>
-            <a:fillRect/>
-          </a:stretch>
-        </p:blipFill>
-        <p:spPr>
-          <a:xfrm>
-            <a:off x="0" y="928125"/>
-            <a:ext cx="9143999" cy="5929875"/>
           </a:xfrm>
           <a:prstGeom prst="rect">
             <a:avLst/>
@@ -29463,33 +29556,23 @@
         </p:nvSpPr>
         <p:spPr>
           <a:xfrm>
-            <a:off x="0" y="0"/>
-            <a:ext cx="9144000" cy="682500"/>
-          </a:xfrm>
-          <a:prstGeom prst="rect">
-            <a:avLst/>
-          </a:prstGeom>
-          <a:noFill/>
-          <a:ln>
-            <a:noFill/>
-          </a:ln>
-        </p:spPr>
-        <p:txBody>
-          <a:bodyPr anchorCtr="0" anchor="t" bIns="45700" lIns="91425" rIns="91425" wrap="square" tIns="45700">
-            <a:noAutofit/>
-          </a:bodyPr>
-          <a:lstStyle/>
-          <a:p>
-            <a:pPr indent="0" lvl="0" marL="0" marR="0" rtl="0" algn="l">
-              <a:lnSpc>
-                <a:spcPct val="100000"/>
-              </a:lnSpc>
-              <a:spcBef>
-                <a:spcPts val="0"/>
-              </a:spcBef>
-              <a:spcAft>
-                <a:spcPts val="0"/>
-              </a:spcAft>
+            <a:off x="12" y="0"/>
+            <a:ext cx="8229600" cy="758700"/>
+          </a:xfrm>
+          <a:prstGeom prst="rect">
+            <a:avLst/>
+          </a:prstGeom>
+        </p:spPr>
+        <p:txBody>
+          <a:bodyPr anchorCtr="0" anchor="t" bIns="91425" lIns="91425" rIns="91425" wrap="square" tIns="91425">
+            <a:noAutofit/>
+          </a:bodyPr>
+          <a:lstStyle/>
+          <a:p>
+            <a:pPr lvl="0">
+              <a:spcBef>
+                <a:spcPts val="0"/>
+              </a:spcBef>
               <a:buClr>
                 <a:schemeClr val="dk2"/>
               </a:buClr>
@@ -29498,27 +29581,11 @@
               <a:buNone/>
             </a:pPr>
             <a:r>
-              <a:rPr b="0" i="0" lang="en-US" sz="3400" u="none" cap="none" strike="noStrike">
-                <a:solidFill>
-                  <a:schemeClr val="dk2"/>
-                </a:solidFill>
-                <a:latin typeface="Arial"/>
-                <a:ea typeface="Arial"/>
-                <a:cs typeface="Arial"/>
-                <a:sym typeface="Arial"/>
-              </a:rPr>
-              <a:t>Best practices – clean up local branches</a:t>
+              <a:rPr lang="en-US"/>
+              <a:t>Best practices – Branch Layout</a:t>
             </a:r>
             <a:br>
-              <a:rPr b="0" i="0" lang="en-US" sz="2400" u="none" cap="none" strike="noStrike">
-                <a:solidFill>
-                  <a:schemeClr val="dk2"/>
-                </a:solidFill>
-                <a:latin typeface="Arial"/>
-                <a:ea typeface="Arial"/>
-                <a:cs typeface="Arial"/>
-                <a:sym typeface="Arial"/>
-              </a:rPr>
+              <a:rPr lang="en-US"/>
             </a:br>
           </a:p>
         </p:txBody>
@@ -29527,20 +29594,54 @@
         <p:nvSpPr>
           <p:cNvPr id="591" name="Shape 591"/>
           <p:cNvSpPr txBox="1"/>
-          <p:nvPr/>
-        </p:nvSpPr>
-        <p:spPr>
-          <a:xfrm>
-            <a:off x="6477000" y="6553200"/>
-            <a:ext cx="1524000" cy="228600"/>
-          </a:xfrm>
-          <a:prstGeom prst="rect">
-            <a:avLst/>
-          </a:prstGeom>
-          <a:noFill/>
-          <a:ln>
-            <a:noFill/>
-          </a:ln>
+          <p:nvPr>
+            <p:ph idx="1" type="body"/>
+          </p:nvPr>
+        </p:nvSpPr>
+        <p:spPr>
+          <a:xfrm>
+            <a:off x="592137" y="1676400"/>
+            <a:ext cx="8229600" cy="4267200"/>
+          </a:xfrm>
+          <a:prstGeom prst="rect">
+            <a:avLst/>
+          </a:prstGeom>
+        </p:spPr>
+        <p:txBody>
+          <a:bodyPr anchorCtr="0" anchor="t" bIns="91425" lIns="91425" rIns="91425" wrap="square" tIns="91425">
+            <a:noAutofit/>
+          </a:bodyPr>
+          <a:lstStyle/>
+          <a:p>
+            <a:pPr lvl="0">
+              <a:spcBef>
+                <a:spcPts val="0"/>
+              </a:spcBef>
+              <a:buNone/>
+            </a:pPr>
+            <a:r>
+              <a:t/>
+            </a:r>
+            <a:endParaRPr/>
+          </a:p>
+        </p:txBody>
+      </p:sp>
+      <p:sp>
+        <p:nvSpPr>
+          <p:cNvPr id="592" name="Shape 592"/>
+          <p:cNvSpPr txBox="1"/>
+          <p:nvPr>
+            <p:ph idx="12" type="sldNum"/>
+          </p:nvPr>
+        </p:nvSpPr>
+        <p:spPr>
+          <a:xfrm>
+            <a:off x="8077200" y="6553200"/>
+            <a:ext cx="838200" cy="228600"/>
+          </a:xfrm>
+          <a:prstGeom prst="rect">
+            <a:avLst/>
+          </a:prstGeom>
         </p:spPr>
         <p:txBody>
           <a:bodyPr anchorCtr="0" anchor="t" bIns="45700" lIns="91425" rIns="91425" wrap="square" tIns="45700">
@@ -29548,16 +29649,10 @@
           </a:bodyPr>
           <a:lstStyle/>
           <a:p>
-            <a:pPr indent="0" lvl="0" marL="0" marR="0" rtl="0" algn="l">
-              <a:lnSpc>
-                <a:spcPct val="100000"/>
-              </a:lnSpc>
-              <a:spcBef>
-                <a:spcPts val="0"/>
-              </a:spcBef>
-              <a:spcAft>
-                <a:spcPts val="0"/>
-              </a:spcAft>
+            <a:pPr lvl="0">
+              <a:spcBef>
+                <a:spcPts val="0"/>
+              </a:spcBef>
               <a:buClr>
                 <a:schemeClr val="lt2"/>
               </a:buClr>
@@ -29565,73 +29660,8 @@
               <a:buFont typeface="Arial"/>
               <a:buNone/>
             </a:pPr>
-            <a:r>
-              <a:rPr b="0" i="0" lang="en-US" sz="700" u="none">
-                <a:solidFill>
-                  <a:schemeClr val="lt2"/>
-                </a:solidFill>
-                <a:latin typeface="Arial"/>
-                <a:ea typeface="Arial"/>
-                <a:cs typeface="Arial"/>
-                <a:sym typeface="Arial"/>
-              </a:rPr>
-              <a:t>*</a:t>
-            </a:r>
-          </a:p>
-        </p:txBody>
-      </p:sp>
-      <p:sp>
-        <p:nvSpPr>
-          <p:cNvPr id="592" name="Shape 592"/>
-          <p:cNvSpPr txBox="1"/>
-          <p:nvPr/>
-        </p:nvSpPr>
-        <p:spPr>
-          <a:xfrm>
-            <a:off x="8077200" y="6553200"/>
-            <a:ext cx="838200" cy="228600"/>
-          </a:xfrm>
-          <a:prstGeom prst="rect">
-            <a:avLst/>
-          </a:prstGeom>
-          <a:noFill/>
-          <a:ln>
-            <a:noFill/>
-          </a:ln>
-        </p:spPr>
-        <p:txBody>
-          <a:bodyPr anchorCtr="0" anchor="t" bIns="45700" lIns="91425" rIns="91425" wrap="square" tIns="45700">
-            <a:noAutofit/>
-          </a:bodyPr>
-          <a:lstStyle/>
-          <a:p>
-            <a:pPr indent="0" lvl="0" marL="0" marR="0" rtl="0" algn="r">
-              <a:lnSpc>
-                <a:spcPct val="100000"/>
-              </a:lnSpc>
-              <a:spcBef>
-                <a:spcPts val="0"/>
-              </a:spcBef>
-              <a:spcAft>
-                <a:spcPts val="0"/>
-              </a:spcAft>
-              <a:buClr>
-                <a:schemeClr val="lt2"/>
-              </a:buClr>
-              <a:buSzPct val="25000"/>
-              <a:buFont typeface="Arial"/>
-              <a:buNone/>
-            </a:pPr>
             <a:fld id="{00000000-1234-1234-1234-123412341234}" type="slidenum">
-              <a:rPr b="0" i="0" lang="en-US" sz="700" u="none">
-                <a:solidFill>
-                  <a:schemeClr val="lt2"/>
-                </a:solidFill>
-                <a:latin typeface="Arial"/>
-                <a:ea typeface="Arial"/>
-                <a:cs typeface="Arial"/>
-                <a:sym typeface="Arial"/>
-              </a:rPr>
+              <a:rPr lang="en-US"/>
               <a:t>‹#›</a:t>
             </a:fld>
           </a:p>
@@ -29639,7 +29669,7 @@
       </p:sp>
       <p:pic>
         <p:nvPicPr>
-          <p:cNvPr descr="Delete_local_feature_branch.png" id="593" name="Shape 593"/>
+          <p:cNvPr id="593" name="Shape 593"/>
           <p:cNvPicPr preferRelativeResize="0"/>
           <p:nvPr/>
         </p:nvPicPr>
@@ -29653,8 +29683,8 @@
         </p:blipFill>
         <p:spPr>
           <a:xfrm>
-            <a:off x="0" y="1047850"/>
-            <a:ext cx="9144001" cy="5733950"/>
+            <a:off x="0" y="928125"/>
+            <a:ext cx="9143999" cy="5929875"/>
           </a:xfrm>
           <a:prstGeom prst="rect">
             <a:avLst/>
@@ -29700,6 +29730,243 @@
         </p:nvSpPr>
         <p:spPr>
           <a:xfrm>
+            <a:off x="0" y="0"/>
+            <a:ext cx="9144000" cy="682500"/>
+          </a:xfrm>
+          <a:prstGeom prst="rect">
+            <a:avLst/>
+          </a:prstGeom>
+          <a:noFill/>
+          <a:ln>
+            <a:noFill/>
+          </a:ln>
+        </p:spPr>
+        <p:txBody>
+          <a:bodyPr anchorCtr="0" anchor="t" bIns="45700" lIns="91425" rIns="91425" wrap="square" tIns="45700">
+            <a:noAutofit/>
+          </a:bodyPr>
+          <a:lstStyle/>
+          <a:p>
+            <a:pPr indent="0" lvl="0" marL="0" marR="0" rtl="0" algn="l">
+              <a:lnSpc>
+                <a:spcPct val="100000"/>
+              </a:lnSpc>
+              <a:spcBef>
+                <a:spcPts val="0"/>
+              </a:spcBef>
+              <a:spcAft>
+                <a:spcPts val="0"/>
+              </a:spcAft>
+              <a:buClr>
+                <a:schemeClr val="dk2"/>
+              </a:buClr>
+              <a:buSzPct val="25000"/>
+              <a:buFont typeface="Arial"/>
+              <a:buNone/>
+            </a:pPr>
+            <a:r>
+              <a:rPr b="0" i="0" lang="en-US" sz="3400" u="none" cap="none" strike="noStrike">
+                <a:solidFill>
+                  <a:schemeClr val="dk2"/>
+                </a:solidFill>
+                <a:latin typeface="Arial"/>
+                <a:ea typeface="Arial"/>
+                <a:cs typeface="Arial"/>
+                <a:sym typeface="Arial"/>
+              </a:rPr>
+              <a:t>Best practices – clean up local branches</a:t>
+            </a:r>
+            <a:br>
+              <a:rPr b="0" i="0" lang="en-US" sz="2400" u="none" cap="none" strike="noStrike">
+                <a:solidFill>
+                  <a:schemeClr val="dk2"/>
+                </a:solidFill>
+                <a:latin typeface="Arial"/>
+                <a:ea typeface="Arial"/>
+                <a:cs typeface="Arial"/>
+                <a:sym typeface="Arial"/>
+              </a:rPr>
+            </a:br>
+          </a:p>
+        </p:txBody>
+      </p:sp>
+      <p:sp>
+        <p:nvSpPr>
+          <p:cNvPr id="599" name="Shape 599"/>
+          <p:cNvSpPr txBox="1"/>
+          <p:nvPr/>
+        </p:nvSpPr>
+        <p:spPr>
+          <a:xfrm>
+            <a:off x="6477000" y="6553200"/>
+            <a:ext cx="1524000" cy="228600"/>
+          </a:xfrm>
+          <a:prstGeom prst="rect">
+            <a:avLst/>
+          </a:prstGeom>
+          <a:noFill/>
+          <a:ln>
+            <a:noFill/>
+          </a:ln>
+        </p:spPr>
+        <p:txBody>
+          <a:bodyPr anchorCtr="0" anchor="t" bIns="45700" lIns="91425" rIns="91425" wrap="square" tIns="45700">
+            <a:noAutofit/>
+          </a:bodyPr>
+          <a:lstStyle/>
+          <a:p>
+            <a:pPr indent="0" lvl="0" marL="0" marR="0" rtl="0" algn="l">
+              <a:lnSpc>
+                <a:spcPct val="100000"/>
+              </a:lnSpc>
+              <a:spcBef>
+                <a:spcPts val="0"/>
+              </a:spcBef>
+              <a:spcAft>
+                <a:spcPts val="0"/>
+              </a:spcAft>
+              <a:buClr>
+                <a:schemeClr val="lt2"/>
+              </a:buClr>
+              <a:buSzPct val="25000"/>
+              <a:buFont typeface="Arial"/>
+              <a:buNone/>
+            </a:pPr>
+            <a:r>
+              <a:rPr b="0" i="0" lang="en-US" sz="700" u="none">
+                <a:solidFill>
+                  <a:schemeClr val="lt2"/>
+                </a:solidFill>
+                <a:latin typeface="Arial"/>
+                <a:ea typeface="Arial"/>
+                <a:cs typeface="Arial"/>
+                <a:sym typeface="Arial"/>
+              </a:rPr>
+              <a:t>*</a:t>
+            </a:r>
+          </a:p>
+        </p:txBody>
+      </p:sp>
+      <p:sp>
+        <p:nvSpPr>
+          <p:cNvPr id="600" name="Shape 600"/>
+          <p:cNvSpPr txBox="1"/>
+          <p:nvPr/>
+        </p:nvSpPr>
+        <p:spPr>
+          <a:xfrm>
+            <a:off x="8077200" y="6553200"/>
+            <a:ext cx="838200" cy="228600"/>
+          </a:xfrm>
+          <a:prstGeom prst="rect">
+            <a:avLst/>
+          </a:prstGeom>
+          <a:noFill/>
+          <a:ln>
+            <a:noFill/>
+          </a:ln>
+        </p:spPr>
+        <p:txBody>
+          <a:bodyPr anchorCtr="0" anchor="t" bIns="45700" lIns="91425" rIns="91425" wrap="square" tIns="45700">
+            <a:noAutofit/>
+          </a:bodyPr>
+          <a:lstStyle/>
+          <a:p>
+            <a:pPr indent="0" lvl="0" marL="0" marR="0" rtl="0" algn="r">
+              <a:lnSpc>
+                <a:spcPct val="100000"/>
+              </a:lnSpc>
+              <a:spcBef>
+                <a:spcPts val="0"/>
+              </a:spcBef>
+              <a:spcAft>
+                <a:spcPts val="0"/>
+              </a:spcAft>
+              <a:buClr>
+                <a:schemeClr val="lt2"/>
+              </a:buClr>
+              <a:buSzPct val="25000"/>
+              <a:buFont typeface="Arial"/>
+              <a:buNone/>
+            </a:pPr>
+            <a:fld id="{00000000-1234-1234-1234-123412341234}" type="slidenum">
+              <a:rPr b="0" i="0" lang="en-US" sz="700" u="none">
+                <a:solidFill>
+                  <a:schemeClr val="lt2"/>
+                </a:solidFill>
+                <a:latin typeface="Arial"/>
+                <a:ea typeface="Arial"/>
+                <a:cs typeface="Arial"/>
+                <a:sym typeface="Arial"/>
+              </a:rPr>
+              <a:t>‹#›</a:t>
+            </a:fld>
+          </a:p>
+        </p:txBody>
+      </p:sp>
+      <p:pic>
+        <p:nvPicPr>
+          <p:cNvPr descr="Delete_local_feature_branch.png" id="601" name="Shape 601"/>
+          <p:cNvPicPr preferRelativeResize="0"/>
+          <p:nvPr/>
+        </p:nvPicPr>
+        <p:blipFill>
+          <a:blip r:embed="rId3">
+            <a:alphaModFix/>
+          </a:blip>
+          <a:stretch>
+            <a:fillRect/>
+          </a:stretch>
+        </p:blipFill>
+        <p:spPr>
+          <a:xfrm>
+            <a:off x="0" y="1047850"/>
+            <a:ext cx="9144001" cy="5733950"/>
+          </a:xfrm>
+          <a:prstGeom prst="rect">
+            <a:avLst/>
+          </a:prstGeom>
+          <a:noFill/>
+          <a:ln>
+            <a:noFill/>
+          </a:ln>
+        </p:spPr>
+      </p:pic>
+    </p:spTree>
+  </p:cSld>
+  <p:clrMapOvr>
+    <a:masterClrMapping/>
+  </p:clrMapOvr>
+</p:sld>
+</file>
+
+<file path=ppt/slides/slide39.xml><?xml version="1.0" encoding="utf-8"?>
+<p:sld xmlns:a="http://schemas.openxmlformats.org/drawingml/2006/main" xmlns:r="http://schemas.openxmlformats.org/officeDocument/2006/relationships" xmlns:mc="http://schemas.openxmlformats.org/markup-compatibility/2006" xmlns:mv="urn:schemas-microsoft-com:mac:vml" xmlns:p="http://schemas.openxmlformats.org/presentationml/2006/main" xmlns:c="http://schemas.openxmlformats.org/drawingml/2006/chart" xmlns:dgm="http://schemas.openxmlformats.org/drawingml/2006/diagram" xmlns:o="urn:schemas-microsoft-com:office:office" xmlns:v="urn:schemas-microsoft-com:vml" xmlns:pvml="urn:schemas-microsoft-com:office:powerpoint" xmlns:com="http://schemas.openxmlformats.org/drawingml/2006/compatibility" xmlns:p14="http://schemas.microsoft.com/office/powerpoint/2010/main" xmlns:p15="http://schemas.microsoft.com/office/powerpoint/2012/main">
+  <p:cSld>
+    <p:spTree>
+      <p:nvGrpSpPr>
+        <p:cNvPr id="605" name="Shape 605"/>
+        <p:cNvGrpSpPr/>
+        <p:nvPr/>
+      </p:nvGrpSpPr>
+      <p:grpSpPr>
+        <a:xfrm>
+          <a:off x="0" y="0"/>
+          <a:ext cx="0" cy="0"/>
+          <a:chOff x="0" y="0"/>
+          <a:chExt cx="0" cy="0"/>
+        </a:xfrm>
+      </p:grpSpPr>
+      <p:sp>
+        <p:nvSpPr>
+          <p:cNvPr id="606" name="Shape 606"/>
+          <p:cNvSpPr txBox="1"/>
+          <p:nvPr>
+            <p:ph type="title"/>
+          </p:nvPr>
+        </p:nvSpPr>
+        <p:spPr>
+          <a:xfrm>
             <a:off x="592137" y="533400"/>
             <a:ext cx="8229600" cy="758825"/>
           </a:xfrm>
@@ -29773,7 +30040,7 @@
       </p:sp>
       <p:sp>
         <p:nvSpPr>
-          <p:cNvPr id="599" name="Shape 599"/>
+          <p:cNvPr id="607" name="Shape 607"/>
           <p:cNvSpPr txBox="1"/>
           <p:nvPr>
             <p:ph idx="1" type="body"/>
@@ -29829,7 +30096,7 @@
       </p:sp>
       <p:sp>
         <p:nvSpPr>
-          <p:cNvPr id="600" name="Shape 600"/>
+          <p:cNvPr id="608" name="Shape 608"/>
           <p:cNvSpPr txBox="1"/>
           <p:nvPr/>
         </p:nvSpPr>
@@ -29886,7 +30153,7 @@
       </p:sp>
       <p:sp>
         <p:nvSpPr>
-          <p:cNvPr id="601" name="Shape 601"/>
+          <p:cNvPr id="609" name="Shape 609"/>
           <p:cNvSpPr txBox="1"/>
           <p:nvPr/>
         </p:nvSpPr>
@@ -29943,7 +30210,7 @@
       </p:sp>
       <p:pic>
         <p:nvPicPr>
-          <p:cNvPr id="602" name="Shape 602"/>
+          <p:cNvPr id="610" name="Shape 610"/>
           <p:cNvPicPr preferRelativeResize="0"/>
           <p:nvPr/>
         </p:nvPicPr>
@@ -29968,184 +30235,6 @@
           </a:ln>
         </p:spPr>
       </p:pic>
-    </p:spTree>
-  </p:cSld>
-  <p:clrMapOvr>
-    <a:masterClrMapping/>
-  </p:clrMapOvr>
-</p:sld>
-</file>
-
-<file path=ppt/slides/slide39.xml><?xml version="1.0" encoding="utf-8"?>
-<p:sld xmlns:a="http://schemas.openxmlformats.org/drawingml/2006/main" xmlns:r="http://schemas.openxmlformats.org/officeDocument/2006/relationships" xmlns:mc="http://schemas.openxmlformats.org/markup-compatibility/2006" xmlns:mv="urn:schemas-microsoft-com:mac:vml" xmlns:p="http://schemas.openxmlformats.org/presentationml/2006/main" xmlns:c="http://schemas.openxmlformats.org/drawingml/2006/chart" xmlns:dgm="http://schemas.openxmlformats.org/drawingml/2006/diagram" xmlns:o="urn:schemas-microsoft-com:office:office" xmlns:v="urn:schemas-microsoft-com:vml" xmlns:pvml="urn:schemas-microsoft-com:office:powerpoint" xmlns:com="http://schemas.openxmlformats.org/drawingml/2006/compatibility" xmlns:p14="http://schemas.microsoft.com/office/powerpoint/2010/main" xmlns:p15="http://schemas.microsoft.com/office/powerpoint/2012/main">
-  <p:cSld>
-    <p:spTree>
-      <p:nvGrpSpPr>
-        <p:cNvPr id="607" name="Shape 607"/>
-        <p:cNvGrpSpPr/>
-        <p:nvPr/>
-      </p:nvGrpSpPr>
-      <p:grpSpPr>
-        <a:xfrm>
-          <a:off x="0" y="0"/>
-          <a:ext cx="0" cy="0"/>
-          <a:chOff x="0" y="0"/>
-          <a:chExt cx="0" cy="0"/>
-        </a:xfrm>
-      </p:grpSpPr>
-      <p:sp>
-        <p:nvSpPr>
-          <p:cNvPr id="608" name="Shape 608"/>
-          <p:cNvSpPr txBox="1"/>
-          <p:nvPr>
-            <p:ph idx="1" type="body"/>
-          </p:nvPr>
-        </p:nvSpPr>
-        <p:spPr>
-          <a:xfrm>
-            <a:off x="0" y="0"/>
-            <a:ext cx="9144000" cy="6858000"/>
-          </a:xfrm>
-          <a:prstGeom prst="rect">
-            <a:avLst/>
-          </a:prstGeom>
-        </p:spPr>
-        <p:txBody>
-          <a:bodyPr anchorCtr="0" anchor="t" bIns="91425" lIns="91425" rIns="91425" wrap="square" tIns="91425">
-            <a:noAutofit/>
-          </a:bodyPr>
-          <a:lstStyle/>
-          <a:p>
-            <a:pPr lvl="0" rtl="0" algn="ctr">
-              <a:spcBef>
-                <a:spcPts val="0"/>
-              </a:spcBef>
-              <a:buNone/>
-            </a:pPr>
-            <a:r>
-              <a:rPr lang="en-US" sz="3600"/>
-              <a:t>Lab 8 - 10</a:t>
-            </a:r>
-          </a:p>
-          <a:p>
-            <a:pPr indent="0" lvl="0" marL="0" rtl="0" algn="l">
-              <a:spcBef>
-                <a:spcPts val="0"/>
-              </a:spcBef>
-              <a:buNone/>
-            </a:pPr>
-            <a:r>
-              <a:t/>
-            </a:r>
-            <a:endParaRPr sz="3000"/>
-          </a:p>
-          <a:p>
-            <a:pPr indent="-419100" lvl="0" marL="457200" rtl="0" algn="l">
-              <a:spcBef>
-                <a:spcPts val="0"/>
-              </a:spcBef>
-              <a:buSzPct val="100000"/>
-            </a:pPr>
-            <a:r>
-              <a:rPr lang="en-US" sz="3000"/>
-              <a:t>We</a:t>
-            </a:r>
-            <a:r>
-              <a:rPr lang="en-US" sz="3000"/>
-              <a:t> will create branch bugfix2, from Release_01</a:t>
-            </a:r>
-          </a:p>
-          <a:p>
-            <a:pPr indent="457200" lvl="0" marL="0" rtl="0">
-              <a:spcBef>
-                <a:spcPts val="0"/>
-              </a:spcBef>
-              <a:buNone/>
-            </a:pPr>
-            <a:r>
-              <a:rPr lang="en-US" sz="3000"/>
-              <a:t>Cherry-pick 1 commit from master branch</a:t>
-            </a:r>
-          </a:p>
-          <a:p>
-            <a:pPr indent="-419100" lvl="0" marL="457200" rtl="0">
-              <a:spcBef>
-                <a:spcPts val="0"/>
-              </a:spcBef>
-              <a:buSzPct val="100000"/>
-            </a:pPr>
-            <a:r>
-              <a:rPr lang="en-US" sz="3000"/>
-              <a:t>Undo modified file, undo staged file</a:t>
-            </a:r>
-          </a:p>
-          <a:p>
-            <a:pPr indent="457200" lvl="0" marL="0" rtl="0">
-              <a:spcBef>
-                <a:spcPts val="0"/>
-              </a:spcBef>
-              <a:buNone/>
-            </a:pPr>
-            <a:r>
-              <a:rPr lang="en-US" sz="3000"/>
-              <a:t>Undo latest local commit, revert pushed commit</a:t>
-            </a:r>
-          </a:p>
-          <a:p>
-            <a:pPr indent="-419100" lvl="0" marL="457200" rtl="0">
-              <a:spcBef>
-                <a:spcPts val="0"/>
-              </a:spcBef>
-              <a:buSzPct val="100000"/>
-            </a:pPr>
-            <a:r>
-              <a:rPr lang="en-US" sz="3000"/>
-              <a:t>Stash meanwhile work aside, make commit, return work from stash</a:t>
-            </a:r>
-          </a:p>
-        </p:txBody>
-      </p:sp>
-      <p:sp>
-        <p:nvSpPr>
-          <p:cNvPr id="609" name="Shape 609"/>
-          <p:cNvSpPr txBox="1"/>
-          <p:nvPr>
-            <p:ph idx="12" type="sldNum"/>
-          </p:nvPr>
-        </p:nvSpPr>
-        <p:spPr>
-          <a:xfrm>
-            <a:off x="8077200" y="6553200"/>
-            <a:ext cx="838200" cy="228600"/>
-          </a:xfrm>
-          <a:prstGeom prst="rect">
-            <a:avLst/>
-          </a:prstGeom>
-        </p:spPr>
-        <p:txBody>
-          <a:bodyPr anchorCtr="0" anchor="t" bIns="45700" lIns="91425" rIns="91425" wrap="square" tIns="45700">
-            <a:noAutofit/>
-          </a:bodyPr>
-          <a:lstStyle/>
-          <a:p>
-            <a:pPr lvl="0" rtl="0">
-              <a:spcBef>
-                <a:spcPts val="0"/>
-              </a:spcBef>
-              <a:buClr>
-                <a:schemeClr val="lt2"/>
-              </a:buClr>
-              <a:buSzPct val="25000"/>
-              <a:buFont typeface="Arial"/>
-              <a:buNone/>
-            </a:pPr>
-            <a:fld id="{00000000-1234-1234-1234-123412341234}" type="slidenum">
-              <a:rPr lang="en-US"/>
-              <a:t>‹#›</a:t>
-            </a:fld>
-          </a:p>
-        </p:txBody>
-      </p:sp>
     </p:spTree>
   </p:cSld>
   <p:clrMapOvr>
@@ -30499,7 +30588,7 @@
   <p:cSld>
     <p:spTree>
       <p:nvGrpSpPr>
-        <p:cNvPr id="614" name="Shape 614"/>
+        <p:cNvPr id="615" name="Shape 615"/>
         <p:cNvGrpSpPr/>
         <p:nvPr/>
       </p:nvGrpSpPr>
@@ -30513,7 +30602,7 @@
       </p:grpSpPr>
       <p:sp>
         <p:nvSpPr>
-          <p:cNvPr id="615" name="Shape 615"/>
+          <p:cNvPr id="616" name="Shape 616"/>
           <p:cNvSpPr txBox="1"/>
           <p:nvPr>
             <p:ph idx="1" type="body"/>
@@ -30542,11 +30631,48 @@
             </a:pPr>
             <a:r>
               <a:rPr lang="en-US" sz="3600"/>
-              <a:t>Lab 11 - 13</a:t>
-            </a:r>
-            <a:br>
-              <a:rPr lang="en-US" sz="3600"/>
-            </a:br>
+              <a:t>Lab 8 - 10</a:t>
+            </a:r>
+          </a:p>
+          <a:p>
+            <a:pPr indent="0" lvl="0" marL="0" rtl="0" algn="l">
+              <a:spcBef>
+                <a:spcPts val="0"/>
+              </a:spcBef>
+              <a:buNone/>
+            </a:pPr>
+            <a:r>
+              <a:t/>
+            </a:r>
+            <a:endParaRPr sz="3000"/>
+          </a:p>
+          <a:p>
+            <a:pPr indent="-419100" lvl="0" marL="457200" rtl="0" algn="l">
+              <a:spcBef>
+                <a:spcPts val="0"/>
+              </a:spcBef>
+              <a:buSzPct val="100000"/>
+            </a:pPr>
+            <a:r>
+              <a:rPr lang="en-US" sz="3000"/>
+              <a:t>We</a:t>
+            </a:r>
+            <a:r>
+              <a:rPr lang="en-US" sz="3000"/>
+              <a:t> will create branch bugfix2, from Release_01</a:t>
+            </a:r>
+          </a:p>
+          <a:p>
+            <a:pPr indent="457200" lvl="0" marL="0" rtl="0">
+              <a:spcBef>
+                <a:spcPts val="0"/>
+              </a:spcBef>
+              <a:buNone/>
+            </a:pPr>
+            <a:r>
+              <a:rPr lang="en-US" sz="3000"/>
+              <a:t>Cherry-pick 1 commit from master branch</a:t>
+            </a:r>
           </a:p>
           <a:p>
             <a:pPr indent="-419100" lvl="0" marL="457200" rtl="0">
@@ -30557,7 +30683,19 @@
             </a:pPr>
             <a:r>
               <a:rPr lang="en-US" sz="3000"/>
-              <a:t>Format patch in 1 repository, and apply it in another repository	</a:t>
+              <a:t>Undo modified file, undo staged file</a:t>
+            </a:r>
+          </a:p>
+          <a:p>
+            <a:pPr indent="457200" lvl="0" marL="0" rtl="0">
+              <a:spcBef>
+                <a:spcPts val="0"/>
+              </a:spcBef>
+              <a:buNone/>
+            </a:pPr>
+            <a:r>
+              <a:rPr lang="en-US" sz="3000"/>
+              <a:t>Undo latest local commit, revert pushed commit</a:t>
             </a:r>
           </a:p>
           <a:p>
@@ -30569,26 +30707,14 @@
             </a:pPr>
             <a:r>
               <a:rPr lang="en-US" sz="3000"/>
-              <a:t>We will create 2 local commits and squash them to 1 commit by interactive rebase, and push only 1 commit to remote repository  </a:t>
-            </a:r>
-          </a:p>
-          <a:p>
-            <a:pPr indent="-419100" lvl="0" marL="457200" rtl="0">
-              <a:spcBef>
-                <a:spcPts val="0"/>
-              </a:spcBef>
-              <a:buSzPct val="100000"/>
-            </a:pPr>
-            <a:r>
-              <a:rPr lang="en-US" sz="3000"/>
-              <a:t>Create commit in 1 repository and pull it from another repository, without pushing to origin repository</a:t>
-            </a:r>
-          </a:p>
-        </p:txBody>
-      </p:sp>
-      <p:sp>
-        <p:nvSpPr>
-          <p:cNvPr id="616" name="Shape 616"/>
+              <a:t>Stash meanwhile work aside, make commit, return work from stash</a:t>
+            </a:r>
+          </a:p>
+        </p:txBody>
+      </p:sp>
+      <p:sp>
+        <p:nvSpPr>
+          <p:cNvPr id="617" name="Shape 617"/>
           <p:cNvSpPr txBox="1"/>
           <p:nvPr>
             <p:ph idx="12" type="sldNum"/>
@@ -30640,7 +30766,7 @@
   <p:cSld>
     <p:spTree>
       <p:nvGrpSpPr>
-        <p:cNvPr id="620" name="Shape 620"/>
+        <p:cNvPr id="622" name="Shape 622"/>
         <p:cNvGrpSpPr/>
         <p:nvPr/>
       </p:nvGrpSpPr>
@@ -30654,24 +30780,95 @@
       </p:grpSpPr>
       <p:sp>
         <p:nvSpPr>
-          <p:cNvPr id="621" name="Shape 621"/>
+          <p:cNvPr id="623" name="Shape 623"/>
           <p:cNvSpPr txBox="1"/>
           <p:nvPr>
-            <p:ph type="title"/>
+            <p:ph idx="1" type="body"/>
           </p:nvPr>
         </p:nvSpPr>
         <p:spPr>
           <a:xfrm>
-            <a:off x="457200" y="2570912"/>
-            <a:ext cx="8229600" cy="1143000"/>
-          </a:xfrm>
-          <a:prstGeom prst="rect">
-            <a:avLst/>
-          </a:prstGeom>
-          <a:noFill/>
-          <a:ln>
-            <a:noFill/>
-          </a:ln>
+            <a:off x="0" y="0"/>
+            <a:ext cx="9144000" cy="6858000"/>
+          </a:xfrm>
+          <a:prstGeom prst="rect">
+            <a:avLst/>
+          </a:prstGeom>
+        </p:spPr>
+        <p:txBody>
+          <a:bodyPr anchorCtr="0" anchor="t" bIns="91425" lIns="91425" rIns="91425" wrap="square" tIns="91425">
+            <a:noAutofit/>
+          </a:bodyPr>
+          <a:lstStyle/>
+          <a:p>
+            <a:pPr lvl="0" rtl="0" algn="ctr">
+              <a:spcBef>
+                <a:spcPts val="0"/>
+              </a:spcBef>
+              <a:buNone/>
+            </a:pPr>
+            <a:r>
+              <a:rPr lang="en-US" sz="3600"/>
+              <a:t>Lab 11 - 13</a:t>
+            </a:r>
+            <a:br>
+              <a:rPr lang="en-US" sz="3600"/>
+            </a:br>
+          </a:p>
+          <a:p>
+            <a:pPr indent="-419100" lvl="0" marL="457200" rtl="0">
+              <a:spcBef>
+                <a:spcPts val="0"/>
+              </a:spcBef>
+              <a:buSzPct val="100000"/>
+            </a:pPr>
+            <a:r>
+              <a:rPr lang="en-US" sz="3000"/>
+              <a:t>Format patch in 1 repository, and apply it in another repository	</a:t>
+            </a:r>
+          </a:p>
+          <a:p>
+            <a:pPr indent="-419100" lvl="0" marL="457200" rtl="0">
+              <a:spcBef>
+                <a:spcPts val="0"/>
+              </a:spcBef>
+              <a:buSzPct val="100000"/>
+            </a:pPr>
+            <a:r>
+              <a:rPr lang="en-US" sz="3000"/>
+              <a:t>We will create 2 local commits and squash them to 1 commit by interactive rebase, and push only 1 commit to remote repository  </a:t>
+            </a:r>
+          </a:p>
+          <a:p>
+            <a:pPr indent="-419100" lvl="0" marL="457200" rtl="0">
+              <a:spcBef>
+                <a:spcPts val="0"/>
+              </a:spcBef>
+              <a:buSzPct val="100000"/>
+            </a:pPr>
+            <a:r>
+              <a:rPr lang="en-US" sz="3000"/>
+              <a:t>Create commit in 1 repository and pull it from another repository, without pushing to origin repository</a:t>
+            </a:r>
+          </a:p>
+        </p:txBody>
+      </p:sp>
+      <p:sp>
+        <p:nvSpPr>
+          <p:cNvPr id="624" name="Shape 624"/>
+          <p:cNvSpPr txBox="1"/>
+          <p:nvPr>
+            <p:ph idx="12" type="sldNum"/>
+          </p:nvPr>
+        </p:nvSpPr>
+        <p:spPr>
+          <a:xfrm>
+            <a:off x="8077200" y="6553200"/>
+            <a:ext cx="838200" cy="228600"/>
+          </a:xfrm>
+          <a:prstGeom prst="rect">
+            <a:avLst/>
+          </a:prstGeom>
         </p:spPr>
         <p:txBody>
           <a:bodyPr anchorCtr="0" anchor="t" bIns="45700" lIns="91425" rIns="91425" wrap="square" tIns="45700">
@@ -30679,142 +30876,10 @@
           </a:bodyPr>
           <a:lstStyle/>
           <a:p>
-            <a:pPr indent="0" lvl="0" marL="0" marR="0" rtl="0" algn="ctr">
-              <a:lnSpc>
-                <a:spcPct val="100000"/>
-              </a:lnSpc>
-              <a:spcBef>
-                <a:spcPts val="0"/>
-              </a:spcBef>
-              <a:spcAft>
-                <a:spcPts val="0"/>
-              </a:spcAft>
-              <a:buClr>
-                <a:schemeClr val="dk2"/>
-              </a:buClr>
-              <a:buSzPct val="25000"/>
-              <a:buFont typeface="Arial"/>
-              <a:buNone/>
-            </a:pPr>
-            <a:r>
-              <a:rPr b="0" i="0" lang="en-US" sz="4400" u="none" cap="none" strike="noStrike">
-                <a:solidFill>
-                  <a:schemeClr val="dk2"/>
-                </a:solidFill>
-                <a:latin typeface="Arial"/>
-                <a:ea typeface="Arial"/>
-                <a:cs typeface="Arial"/>
-                <a:sym typeface="Arial"/>
-              </a:rPr>
-              <a:t>Question?</a:t>
-            </a:r>
-          </a:p>
-          <a:p>
-            <a:pPr indent="0" lvl="0" marL="0" marR="0" rtl="0" algn="ctr">
-              <a:lnSpc>
-                <a:spcPct val="100000"/>
-              </a:lnSpc>
-              <a:spcBef>
-                <a:spcPts val="0"/>
-              </a:spcBef>
-              <a:spcAft>
-                <a:spcPts val="0"/>
-              </a:spcAft>
-              <a:buClr>
-                <a:schemeClr val="dk2"/>
-              </a:buClr>
-              <a:buSzPct val="25000"/>
-              <a:buFont typeface="Arial"/>
-              <a:buNone/>
-            </a:pPr>
-            <a:r>
-              <a:t/>
-            </a:r>
-            <a:endParaRPr sz="4400"/>
-          </a:p>
-          <a:p>
-            <a:pPr indent="0" lvl="0" marL="0" marR="0" rtl="0" algn="ctr">
-              <a:lnSpc>
-                <a:spcPct val="100000"/>
-              </a:lnSpc>
-              <a:spcBef>
-                <a:spcPts val="0"/>
-              </a:spcBef>
-              <a:spcAft>
-                <a:spcPts val="0"/>
-              </a:spcAft>
-              <a:buClr>
-                <a:schemeClr val="dk2"/>
-              </a:buClr>
-              <a:buSzPct val="25000"/>
-              <a:buFont typeface="Arial"/>
-              <a:buNone/>
-            </a:pPr>
-            <a:r>
-              <a:t/>
-            </a:r>
-            <a:endParaRPr sz="4400"/>
-          </a:p>
-          <a:p>
-            <a:pPr indent="0" lvl="0" marL="0" marR="0" rtl="0" algn="ctr">
-              <a:lnSpc>
-                <a:spcPct val="100000"/>
-              </a:lnSpc>
-              <a:spcBef>
-                <a:spcPts val="0"/>
-              </a:spcBef>
-              <a:spcAft>
-                <a:spcPts val="0"/>
-              </a:spcAft>
-              <a:buClr>
-                <a:schemeClr val="dk2"/>
-              </a:buClr>
-              <a:buSzPct val="25000"/>
-              <a:buFont typeface="Arial"/>
-              <a:buNone/>
-            </a:pPr>
-            <a:r>
-              <a:rPr lang="en-US" sz="4400"/>
-              <a:t>Thanks!</a:t>
-            </a:r>
-          </a:p>
-        </p:txBody>
-      </p:sp>
-      <p:sp>
-        <p:nvSpPr>
-          <p:cNvPr id="622" name="Shape 622"/>
-          <p:cNvSpPr txBox="1"/>
-          <p:nvPr/>
-        </p:nvSpPr>
-        <p:spPr>
-          <a:xfrm>
-            <a:off x="6477000" y="6553200"/>
-            <a:ext cx="1524000" cy="228600"/>
-          </a:xfrm>
-          <a:prstGeom prst="rect">
-            <a:avLst/>
-          </a:prstGeom>
-          <a:noFill/>
-          <a:ln>
-            <a:noFill/>
-          </a:ln>
-        </p:spPr>
-        <p:txBody>
-          <a:bodyPr anchorCtr="0" anchor="t" bIns="45700" lIns="91425" rIns="91425" wrap="square" tIns="45700">
-            <a:noAutofit/>
-          </a:bodyPr>
-          <a:lstStyle/>
-          <a:p>
-            <a:pPr indent="0" lvl="0" marL="0" marR="0" rtl="0" algn="l">
-              <a:lnSpc>
-                <a:spcPct val="100000"/>
-              </a:lnSpc>
-              <a:spcBef>
-                <a:spcPts val="0"/>
-              </a:spcBef>
-              <a:spcAft>
-                <a:spcPts val="0"/>
-              </a:spcAft>
+            <a:pPr lvl="0" rtl="0">
+              <a:spcBef>
+                <a:spcPts val="0"/>
+              </a:spcBef>
               <a:buClr>
                 <a:schemeClr val="lt2"/>
               </a:buClr>
@@ -30822,73 +30887,8 @@
               <a:buFont typeface="Arial"/>
               <a:buNone/>
             </a:pPr>
-            <a:r>
-              <a:rPr b="0" i="0" lang="en-US" sz="700" u="none">
-                <a:solidFill>
-                  <a:schemeClr val="lt2"/>
-                </a:solidFill>
-                <a:latin typeface="Arial"/>
-                <a:ea typeface="Arial"/>
-                <a:cs typeface="Arial"/>
-                <a:sym typeface="Arial"/>
-              </a:rPr>
-              <a:t>*</a:t>
-            </a:r>
-          </a:p>
-        </p:txBody>
-      </p:sp>
-      <p:sp>
-        <p:nvSpPr>
-          <p:cNvPr id="623" name="Shape 623"/>
-          <p:cNvSpPr txBox="1"/>
-          <p:nvPr/>
-        </p:nvSpPr>
-        <p:spPr>
-          <a:xfrm>
-            <a:off x="8077200" y="6553200"/>
-            <a:ext cx="838200" cy="228600"/>
-          </a:xfrm>
-          <a:prstGeom prst="rect">
-            <a:avLst/>
-          </a:prstGeom>
-          <a:noFill/>
-          <a:ln>
-            <a:noFill/>
-          </a:ln>
-        </p:spPr>
-        <p:txBody>
-          <a:bodyPr anchorCtr="0" anchor="t" bIns="45700" lIns="91425" rIns="91425" wrap="square" tIns="45700">
-            <a:noAutofit/>
-          </a:bodyPr>
-          <a:lstStyle/>
-          <a:p>
-            <a:pPr indent="0" lvl="0" marL="0" marR="0" rtl="0" algn="r">
-              <a:lnSpc>
-                <a:spcPct val="100000"/>
-              </a:lnSpc>
-              <a:spcBef>
-                <a:spcPts val="0"/>
-              </a:spcBef>
-              <a:spcAft>
-                <a:spcPts val="0"/>
-              </a:spcAft>
-              <a:buClr>
-                <a:schemeClr val="lt2"/>
-              </a:buClr>
-              <a:buSzPct val="25000"/>
-              <a:buFont typeface="Arial"/>
-              <a:buNone/>
-            </a:pPr>
             <a:fld id="{00000000-1234-1234-1234-123412341234}" type="slidenum">
-              <a:rPr b="0" i="0" lang="en-US" sz="700" u="none">
-                <a:solidFill>
-                  <a:schemeClr val="lt2"/>
-                </a:solidFill>
-                <a:latin typeface="Arial"/>
-                <a:ea typeface="Arial"/>
-                <a:cs typeface="Arial"/>
-                <a:sym typeface="Arial"/>
-              </a:rPr>
+              <a:rPr lang="en-US"/>
               <a:t>‹#›</a:t>
             </a:fld>
           </a:p>
@@ -30929,28 +30929,120 @@
         </p:nvSpPr>
         <p:spPr>
           <a:xfrm>
-            <a:off x="592137" y="533400"/>
-            <a:ext cx="8229600" cy="758700"/>
-          </a:xfrm>
-          <a:prstGeom prst="rect">
-            <a:avLst/>
-          </a:prstGeom>
-        </p:spPr>
-        <p:txBody>
-          <a:bodyPr anchorCtr="0" anchor="t" bIns="91425" lIns="91425" rIns="91425" wrap="square" tIns="91425">
-            <a:noAutofit/>
-          </a:bodyPr>
-          <a:lstStyle/>
-          <a:p>
-            <a:pPr lvl="0" algn="ctr">
-              <a:spcBef>
-                <a:spcPts val="0"/>
-              </a:spcBef>
-              <a:buNone/>
-            </a:pPr>
-            <a:r>
-              <a:rPr lang="en-US"/>
-              <a:t>Backup slides</a:t>
+            <a:off x="457200" y="2570912"/>
+            <a:ext cx="8229600" cy="1143000"/>
+          </a:xfrm>
+          <a:prstGeom prst="rect">
+            <a:avLst/>
+          </a:prstGeom>
+          <a:noFill/>
+          <a:ln>
+            <a:noFill/>
+          </a:ln>
+        </p:spPr>
+        <p:txBody>
+          <a:bodyPr anchorCtr="0" anchor="t" bIns="45700" lIns="91425" rIns="91425" wrap="square" tIns="45700">
+            <a:noAutofit/>
+          </a:bodyPr>
+          <a:lstStyle/>
+          <a:p>
+            <a:pPr indent="0" lvl="0" marL="0" marR="0" rtl="0" algn="ctr">
+              <a:lnSpc>
+                <a:spcPct val="100000"/>
+              </a:lnSpc>
+              <a:spcBef>
+                <a:spcPts val="0"/>
+              </a:spcBef>
+              <a:spcAft>
+                <a:spcPts val="0"/>
+              </a:spcAft>
+              <a:buClr>
+                <a:schemeClr val="dk2"/>
+              </a:buClr>
+              <a:buSzPct val="25000"/>
+              <a:buFont typeface="Arial"/>
+              <a:buNone/>
+            </a:pPr>
+            <a:r>
+              <a:rPr b="0" i="0" lang="en-US" sz="4400" u="none" cap="none" strike="noStrike">
+                <a:solidFill>
+                  <a:schemeClr val="dk2"/>
+                </a:solidFill>
+                <a:latin typeface="Arial"/>
+                <a:ea typeface="Arial"/>
+                <a:cs typeface="Arial"/>
+                <a:sym typeface="Arial"/>
+              </a:rPr>
+              <a:t>Question?</a:t>
+            </a:r>
+          </a:p>
+          <a:p>
+            <a:pPr indent="0" lvl="0" marL="0" marR="0" rtl="0" algn="ctr">
+              <a:lnSpc>
+                <a:spcPct val="100000"/>
+              </a:lnSpc>
+              <a:spcBef>
+                <a:spcPts val="0"/>
+              </a:spcBef>
+              <a:spcAft>
+                <a:spcPts val="0"/>
+              </a:spcAft>
+              <a:buClr>
+                <a:schemeClr val="dk2"/>
+              </a:buClr>
+              <a:buSzPct val="25000"/>
+              <a:buFont typeface="Arial"/>
+              <a:buNone/>
+            </a:pPr>
+            <a:r>
+              <a:t/>
+            </a:r>
+            <a:endParaRPr sz="4400"/>
+          </a:p>
+          <a:p>
+            <a:pPr indent="0" lvl="0" marL="0" marR="0" rtl="0" algn="ctr">
+              <a:lnSpc>
+                <a:spcPct val="100000"/>
+              </a:lnSpc>
+              <a:spcBef>
+                <a:spcPts val="0"/>
+              </a:spcBef>
+              <a:spcAft>
+                <a:spcPts val="0"/>
+              </a:spcAft>
+              <a:buClr>
+                <a:schemeClr val="dk2"/>
+              </a:buClr>
+              <a:buSzPct val="25000"/>
+              <a:buFont typeface="Arial"/>
+              <a:buNone/>
+            </a:pPr>
+            <a:r>
+              <a:t/>
+            </a:r>
+            <a:endParaRPr sz="4400"/>
+          </a:p>
+          <a:p>
+            <a:pPr indent="0" lvl="0" marL="0" marR="0" rtl="0" algn="ctr">
+              <a:lnSpc>
+                <a:spcPct val="100000"/>
+              </a:lnSpc>
+              <a:spcBef>
+                <a:spcPts val="0"/>
+              </a:spcBef>
+              <a:spcAft>
+                <a:spcPts val="0"/>
+              </a:spcAft>
+              <a:buClr>
+                <a:schemeClr val="dk2"/>
+              </a:buClr>
+              <a:buSzPct val="25000"/>
+              <a:buFont typeface="Arial"/>
+              <a:buNone/>
+            </a:pPr>
+            <a:r>
+              <a:rPr lang="en-US" sz="4400"/>
+              <a:t>Thanks!</a:t>
             </a:r>
           </a:p>
         </p:txBody>
@@ -30959,18 +31051,20 @@
         <p:nvSpPr>
           <p:cNvPr id="630" name="Shape 630"/>
           <p:cNvSpPr txBox="1"/>
-          <p:nvPr>
-            <p:ph idx="12" type="sldNum"/>
-          </p:nvPr>
-        </p:nvSpPr>
-        <p:spPr>
-          <a:xfrm>
-            <a:off x="8077200" y="6553200"/>
-            <a:ext cx="838200" cy="228600"/>
-          </a:xfrm>
-          <a:prstGeom prst="rect">
-            <a:avLst/>
-          </a:prstGeom>
+          <p:nvPr/>
+        </p:nvSpPr>
+        <p:spPr>
+          <a:xfrm>
+            <a:off x="6477000" y="6553200"/>
+            <a:ext cx="1524000" cy="228600"/>
+          </a:xfrm>
+          <a:prstGeom prst="rect">
+            <a:avLst/>
+          </a:prstGeom>
+          <a:noFill/>
+          <a:ln>
+            <a:noFill/>
+          </a:ln>
         </p:spPr>
         <p:txBody>
           <a:bodyPr anchorCtr="0" anchor="t" bIns="45700" lIns="91425" rIns="91425" wrap="square" tIns="45700">
@@ -30978,10 +31072,16 @@
           </a:bodyPr>
           <a:lstStyle/>
           <a:p>
-            <a:pPr lvl="0">
-              <a:spcBef>
-                <a:spcPts val="0"/>
-              </a:spcBef>
+            <a:pPr indent="0" lvl="0" marL="0" marR="0" rtl="0" algn="l">
+              <a:lnSpc>
+                <a:spcPct val="100000"/>
+              </a:lnSpc>
+              <a:spcBef>
+                <a:spcPts val="0"/>
+              </a:spcBef>
+              <a:spcAft>
+                <a:spcPts val="0"/>
+              </a:spcAft>
               <a:buClr>
                 <a:schemeClr val="lt2"/>
               </a:buClr>
@@ -30989,8 +31089,73 @@
               <a:buFont typeface="Arial"/>
               <a:buNone/>
             </a:pPr>
+            <a:r>
+              <a:rPr b="0" i="0" lang="en-US" sz="700" u="none">
+                <a:solidFill>
+                  <a:schemeClr val="lt2"/>
+                </a:solidFill>
+                <a:latin typeface="Arial"/>
+                <a:ea typeface="Arial"/>
+                <a:cs typeface="Arial"/>
+                <a:sym typeface="Arial"/>
+              </a:rPr>
+              <a:t>*</a:t>
+            </a:r>
+          </a:p>
+        </p:txBody>
+      </p:sp>
+      <p:sp>
+        <p:nvSpPr>
+          <p:cNvPr id="631" name="Shape 631"/>
+          <p:cNvSpPr txBox="1"/>
+          <p:nvPr/>
+        </p:nvSpPr>
+        <p:spPr>
+          <a:xfrm>
+            <a:off x="8077200" y="6553200"/>
+            <a:ext cx="838200" cy="228600"/>
+          </a:xfrm>
+          <a:prstGeom prst="rect">
+            <a:avLst/>
+          </a:prstGeom>
+          <a:noFill/>
+          <a:ln>
+            <a:noFill/>
+          </a:ln>
+        </p:spPr>
+        <p:txBody>
+          <a:bodyPr anchorCtr="0" anchor="t" bIns="45700" lIns="91425" rIns="91425" wrap="square" tIns="45700">
+            <a:noAutofit/>
+          </a:bodyPr>
+          <a:lstStyle/>
+          <a:p>
+            <a:pPr indent="0" lvl="0" marL="0" marR="0" rtl="0" algn="r">
+              <a:lnSpc>
+                <a:spcPct val="100000"/>
+              </a:lnSpc>
+              <a:spcBef>
+                <a:spcPts val="0"/>
+              </a:spcBef>
+              <a:spcAft>
+                <a:spcPts val="0"/>
+              </a:spcAft>
+              <a:buClr>
+                <a:schemeClr val="lt2"/>
+              </a:buClr>
+              <a:buSzPct val="25000"/>
+              <a:buFont typeface="Arial"/>
+              <a:buNone/>
+            </a:pPr>
             <a:fld id="{00000000-1234-1234-1234-123412341234}" type="slidenum">
-              <a:rPr lang="en-US"/>
+              <a:rPr b="0" i="0" lang="en-US" sz="700" u="none">
+                <a:solidFill>
+                  <a:schemeClr val="lt2"/>
+                </a:solidFill>
+                <a:latin typeface="Arial"/>
+                <a:ea typeface="Arial"/>
+                <a:cs typeface="Arial"/>
+                <a:sym typeface="Arial"/>
+              </a:rPr>
               <a:t>‹#›</a:t>
             </a:fld>
           </a:p>
@@ -31009,7 +31174,7 @@
   <p:cSld>
     <p:spTree>
       <p:nvGrpSpPr>
-        <p:cNvPr id="635" name="Shape 635"/>
+        <p:cNvPr id="636" name="Shape 636"/>
         <p:cNvGrpSpPr/>
         <p:nvPr/>
       </p:nvGrpSpPr>
@@ -31023,16 +31188,16 @@
       </p:grpSpPr>
       <p:sp>
         <p:nvSpPr>
-          <p:cNvPr id="636" name="Shape 636"/>
+          <p:cNvPr id="637" name="Shape 637"/>
           <p:cNvSpPr txBox="1"/>
           <p:nvPr>
-            <p:ph idx="1" type="body"/>
+            <p:ph type="title"/>
           </p:nvPr>
         </p:nvSpPr>
         <p:spPr>
           <a:xfrm>
-            <a:off x="592137" y="1676400"/>
-            <a:ext cx="8229600" cy="4267200"/>
+            <a:off x="592137" y="533400"/>
+            <a:ext cx="8229600" cy="758700"/>
           </a:xfrm>
           <a:prstGeom prst="rect">
             <a:avLst/>
@@ -31044,22 +31209,22 @@
           </a:bodyPr>
           <a:lstStyle/>
           <a:p>
-            <a:pPr lvl="0">
-              <a:spcBef>
-                <a:spcPts val="0"/>
-              </a:spcBef>
-              <a:buNone/>
-            </a:pPr>
-            <a:r>
-              <a:t/>
-            </a:r>
-            <a:endParaRPr/>
-          </a:p>
-        </p:txBody>
-      </p:sp>
-      <p:sp>
-        <p:nvSpPr>
-          <p:cNvPr id="637" name="Shape 637"/>
+            <a:pPr lvl="0" algn="ctr">
+              <a:spcBef>
+                <a:spcPts val="0"/>
+              </a:spcBef>
+              <a:buNone/>
+            </a:pPr>
+            <a:r>
+              <a:rPr lang="en-US"/>
+              <a:t>Backup slides</a:t>
+            </a:r>
+          </a:p>
+        </p:txBody>
+      </p:sp>
+      <p:sp>
+        <p:nvSpPr>
+          <p:cNvPr id="638" name="Shape 638"/>
           <p:cNvSpPr txBox="1"/>
           <p:nvPr>
             <p:ph idx="12" type="sldNum"/>
@@ -31098,34 +31263,6 @@
           </a:p>
         </p:txBody>
       </p:sp>
-      <p:pic>
-        <p:nvPicPr>
-          <p:cNvPr id="638" name="Shape 638"/>
-          <p:cNvPicPr preferRelativeResize="0"/>
-          <p:nvPr/>
-        </p:nvPicPr>
-        <p:blipFill>
-          <a:blip r:embed="rId3">
-            <a:alphaModFix/>
-          </a:blip>
-          <a:stretch>
-            <a:fillRect/>
-          </a:stretch>
-        </p:blipFill>
-        <p:spPr>
-          <a:xfrm>
-            <a:off x="0" y="0"/>
-            <a:ext cx="9143999" cy="6469800"/>
-          </a:xfrm>
-          <a:prstGeom prst="rect">
-            <a:avLst/>
-          </a:prstGeom>
-          <a:noFill/>
-          <a:ln>
-            <a:noFill/>
-          </a:ln>
-        </p:spPr>
-      </p:pic>
     </p:spTree>
   </p:cSld>
   <p:clrMapOvr>
@@ -31156,6 +31293,42 @@
           <p:cNvPr id="644" name="Shape 644"/>
           <p:cNvSpPr txBox="1"/>
           <p:nvPr>
+            <p:ph idx="1" type="body"/>
+          </p:nvPr>
+        </p:nvSpPr>
+        <p:spPr>
+          <a:xfrm>
+            <a:off x="592137" y="1676400"/>
+            <a:ext cx="8229600" cy="4267200"/>
+          </a:xfrm>
+          <a:prstGeom prst="rect">
+            <a:avLst/>
+          </a:prstGeom>
+        </p:spPr>
+        <p:txBody>
+          <a:bodyPr anchorCtr="0" anchor="t" bIns="91425" lIns="91425" rIns="91425" wrap="square" tIns="91425">
+            <a:noAutofit/>
+          </a:bodyPr>
+          <a:lstStyle/>
+          <a:p>
+            <a:pPr lvl="0">
+              <a:spcBef>
+                <a:spcPts val="0"/>
+              </a:spcBef>
+              <a:buNone/>
+            </a:pPr>
+            <a:r>
+              <a:t/>
+            </a:r>
+            <a:endParaRPr/>
+          </a:p>
+        </p:txBody>
+      </p:sp>
+      <p:sp>
+        <p:nvSpPr>
+          <p:cNvPr id="645" name="Shape 645"/>
+          <p:cNvSpPr txBox="1"/>
+          <p:nvPr>
             <p:ph idx="12" type="sldNum"/>
           </p:nvPr>
         </p:nvSpPr>
@@ -31194,7 +31367,7 @@
       </p:sp>
       <p:pic>
         <p:nvPicPr>
-          <p:cNvPr id="645" name="Shape 645"/>
+          <p:cNvPr id="646" name="Shape 646"/>
           <p:cNvPicPr preferRelativeResize="0"/>
           <p:nvPr/>
         </p:nvPicPr>
@@ -31209,7 +31382,7 @@
         <p:spPr>
           <a:xfrm>
             <a:off x="0" y="0"/>
-            <a:ext cx="9143999" cy="6139235"/>
+            <a:ext cx="9143999" cy="6469800"/>
           </a:xfrm>
           <a:prstGeom prst="rect">
             <a:avLst/>
@@ -31233,7 +31406,7 @@
   <p:cSld>
     <p:spTree>
       <p:nvGrpSpPr>
-        <p:cNvPr id="650" name="Shape 650"/>
+        <p:cNvPr id="651" name="Shape 651"/>
         <p:cNvGrpSpPr/>
         <p:nvPr/>
       </p:nvGrpSpPr>
@@ -31247,7 +31420,7 @@
       </p:grpSpPr>
       <p:sp>
         <p:nvSpPr>
-          <p:cNvPr id="651" name="Shape 651"/>
+          <p:cNvPr id="652" name="Shape 652"/>
           <p:cNvSpPr txBox="1"/>
           <p:nvPr>
             <p:ph idx="12" type="sldNum"/>
@@ -31288,7 +31461,7 @@
       </p:sp>
       <p:pic>
         <p:nvPicPr>
-          <p:cNvPr id="652" name="Shape 652"/>
+          <p:cNvPr id="653" name="Shape 653"/>
           <p:cNvPicPr preferRelativeResize="0"/>
           <p:nvPr/>
         </p:nvPicPr>
@@ -31303,7 +31476,7 @@
         <p:spPr>
           <a:xfrm>
             <a:off x="0" y="0"/>
-            <a:ext cx="9143999" cy="6031144"/>
+            <a:ext cx="9143999" cy="6139235"/>
           </a:xfrm>
           <a:prstGeom prst="rect">
             <a:avLst/>
@@ -31327,7 +31500,7 @@
   <p:cSld>
     <p:spTree>
       <p:nvGrpSpPr>
-        <p:cNvPr id="657" name="Shape 657"/>
+        <p:cNvPr id="658" name="Shape 658"/>
         <p:cNvGrpSpPr/>
         <p:nvPr/>
       </p:nvGrpSpPr>
@@ -31339,42 +31512,6 @@
           <a:chExt cx="0" cy="0"/>
         </a:xfrm>
       </p:grpSpPr>
-      <p:sp>
-        <p:nvSpPr>
-          <p:cNvPr id="658" name="Shape 658"/>
-          <p:cNvSpPr txBox="1"/>
-          <p:nvPr>
-            <p:ph idx="1" type="body"/>
-          </p:nvPr>
-        </p:nvSpPr>
-        <p:spPr>
-          <a:xfrm>
-            <a:off x="592137" y="1676400"/>
-            <a:ext cx="8229600" cy="4267200"/>
-          </a:xfrm>
-          <a:prstGeom prst="rect">
-            <a:avLst/>
-          </a:prstGeom>
-        </p:spPr>
-        <p:txBody>
-          <a:bodyPr anchorCtr="0" anchor="t" bIns="91425" lIns="91425" rIns="91425" wrap="square" tIns="91425">
-            <a:noAutofit/>
-          </a:bodyPr>
-          <a:lstStyle/>
-          <a:p>
-            <a:pPr lvl="0">
-              <a:spcBef>
-                <a:spcPts val="0"/>
-              </a:spcBef>
-              <a:buNone/>
-            </a:pPr>
-            <a:r>
-              <a:t/>
-            </a:r>
-            <a:endParaRPr/>
-          </a:p>
-        </p:txBody>
-      </p:sp>
       <p:sp>
         <p:nvSpPr>
           <p:cNvPr id="659" name="Shape 659"/>
@@ -31433,7 +31570,7 @@
         <p:spPr>
           <a:xfrm>
             <a:off x="0" y="0"/>
-            <a:ext cx="9143999" cy="6485975"/>
+            <a:ext cx="9143999" cy="6031144"/>
           </a:xfrm>
           <a:prstGeom prst="rect">
             <a:avLst/>
@@ -31563,7 +31700,7 @@
         <p:spPr>
           <a:xfrm>
             <a:off x="0" y="0"/>
-            <a:ext cx="9144001" cy="5995359"/>
+            <a:ext cx="9143999" cy="6485975"/>
           </a:xfrm>
           <a:prstGeom prst="rect">
             <a:avLst/>
@@ -31693,7 +31830,7 @@
         <p:spPr>
           <a:xfrm>
             <a:off x="0" y="0"/>
-            <a:ext cx="9143999" cy="5871350"/>
+            <a:ext cx="9144001" cy="5995359"/>
           </a:xfrm>
           <a:prstGeom prst="rect">
             <a:avLst/>
@@ -31734,6 +31871,42 @@
           <p:cNvPr id="682" name="Shape 682"/>
           <p:cNvSpPr txBox="1"/>
           <p:nvPr>
+            <p:ph idx="1" type="body"/>
+          </p:nvPr>
+        </p:nvSpPr>
+        <p:spPr>
+          <a:xfrm>
+            <a:off x="592137" y="1676400"/>
+            <a:ext cx="8229600" cy="4267200"/>
+          </a:xfrm>
+          <a:prstGeom prst="rect">
+            <a:avLst/>
+          </a:prstGeom>
+        </p:spPr>
+        <p:txBody>
+          <a:bodyPr anchorCtr="0" anchor="t" bIns="91425" lIns="91425" rIns="91425" wrap="square" tIns="91425">
+            <a:noAutofit/>
+          </a:bodyPr>
+          <a:lstStyle/>
+          <a:p>
+            <a:pPr lvl="0">
+              <a:spcBef>
+                <a:spcPts val="0"/>
+              </a:spcBef>
+              <a:buNone/>
+            </a:pPr>
+            <a:r>
+              <a:t/>
+            </a:r>
+            <a:endParaRPr/>
+          </a:p>
+        </p:txBody>
+      </p:sp>
+      <p:sp>
+        <p:nvSpPr>
+          <p:cNvPr id="683" name="Shape 683"/>
+          <p:cNvSpPr txBox="1"/>
+          <p:nvPr>
             <p:ph idx="12" type="sldNum"/>
           </p:nvPr>
         </p:nvSpPr>
@@ -31772,7 +31945,7 @@
       </p:sp>
       <p:pic>
         <p:nvPicPr>
-          <p:cNvPr descr="image4.png" id="683" name="Shape 683"/>
+          <p:cNvPr id="684" name="Shape 684"/>
           <p:cNvPicPr preferRelativeResize="0"/>
           <p:nvPr/>
         </p:nvPicPr>
@@ -31786,8 +31959,8 @@
         </p:blipFill>
         <p:spPr>
           <a:xfrm>
-            <a:off x="1870375" y="75825"/>
-            <a:ext cx="7273626" cy="6782175"/>
+            <a:off x="0" y="0"/>
+            <a:ext cx="9143999" cy="5871350"/>
           </a:xfrm>
           <a:prstGeom prst="rect">
             <a:avLst/>
@@ -31798,68 +31971,6 @@
           </a:ln>
         </p:spPr>
       </p:pic>
-      <p:sp>
-        <p:nvSpPr>
-          <p:cNvPr id="684" name="Shape 684"/>
-          <p:cNvSpPr txBox="1"/>
-          <p:nvPr/>
-        </p:nvSpPr>
-        <p:spPr>
-          <a:xfrm>
-            <a:off x="0" y="434975"/>
-            <a:ext cx="2740200" cy="1638300"/>
-          </a:xfrm>
-          <a:prstGeom prst="rect">
-            <a:avLst/>
-          </a:prstGeom>
-          <a:noFill/>
-          <a:ln>
-            <a:noFill/>
-          </a:ln>
-        </p:spPr>
-        <p:txBody>
-          <a:bodyPr anchorCtr="0" anchor="t" bIns="91425" lIns="91425" rIns="91425" wrap="square" tIns="91425">
-            <a:noAutofit/>
-          </a:bodyPr>
-          <a:lstStyle/>
-          <a:p>
-            <a:pPr lvl="0">
-              <a:spcBef>
-                <a:spcPts val="0"/>
-              </a:spcBef>
-              <a:buNone/>
-            </a:pPr>
-            <a:r>
-              <a:rPr lang="en-US" sz="2400"/>
-              <a:t>Git Master-&gt;Slave </a:t>
-            </a:r>
-          </a:p>
-          <a:p>
-            <a:pPr lvl="0">
-              <a:spcBef>
-                <a:spcPts val="0"/>
-              </a:spcBef>
-              <a:buNone/>
-            </a:pPr>
-            <a:r>
-              <a:t/>
-            </a:r>
-            <a:endParaRPr sz="2400"/>
-          </a:p>
-          <a:p>
-            <a:pPr lvl="0">
-              <a:spcBef>
-                <a:spcPts val="0"/>
-              </a:spcBef>
-              <a:buNone/>
-            </a:pPr>
-            <a:r>
-              <a:rPr lang="en-US" sz="2400"/>
-              <a:t>Mirroring</a:t>
-            </a:r>
-          </a:p>
-        </p:txBody>
-      </p:sp>
     </p:spTree>
   </p:cSld>
   <p:clrMapOvr>
@@ -32041,7 +32152,7 @@
   <p:cSld>
     <p:spTree>
       <p:nvGrpSpPr>
-        <p:cNvPr id="688" name="Shape 688"/>
+        <p:cNvPr id="689" name="Shape 689"/>
         <p:cNvGrpSpPr/>
         <p:nvPr/>
       </p:nvGrpSpPr>
@@ -32055,7 +32166,163 @@
       </p:grpSpPr>
       <p:sp>
         <p:nvSpPr>
-          <p:cNvPr id="689" name="Shape 689"/>
+          <p:cNvPr id="690" name="Shape 690"/>
+          <p:cNvSpPr txBox="1"/>
+          <p:nvPr>
+            <p:ph idx="12" type="sldNum"/>
+          </p:nvPr>
+        </p:nvSpPr>
+        <p:spPr>
+          <a:xfrm>
+            <a:off x="8077200" y="6553200"/>
+            <a:ext cx="838200" cy="228600"/>
+          </a:xfrm>
+          <a:prstGeom prst="rect">
+            <a:avLst/>
+          </a:prstGeom>
+        </p:spPr>
+        <p:txBody>
+          <a:bodyPr anchorCtr="0" anchor="t" bIns="45700" lIns="91425" rIns="91425" wrap="square" tIns="45700">
+            <a:noAutofit/>
+          </a:bodyPr>
+          <a:lstStyle/>
+          <a:p>
+            <a:pPr lvl="0">
+              <a:spcBef>
+                <a:spcPts val="0"/>
+              </a:spcBef>
+              <a:buClr>
+                <a:schemeClr val="lt2"/>
+              </a:buClr>
+              <a:buSzPct val="25000"/>
+              <a:buFont typeface="Arial"/>
+              <a:buNone/>
+            </a:pPr>
+            <a:fld id="{00000000-1234-1234-1234-123412341234}" type="slidenum">
+              <a:rPr lang="en-US"/>
+              <a:t>‹#›</a:t>
+            </a:fld>
+          </a:p>
+        </p:txBody>
+      </p:sp>
+      <p:pic>
+        <p:nvPicPr>
+          <p:cNvPr descr="image4.png" id="691" name="Shape 691"/>
+          <p:cNvPicPr preferRelativeResize="0"/>
+          <p:nvPr/>
+        </p:nvPicPr>
+        <p:blipFill>
+          <a:blip r:embed="rId3">
+            <a:alphaModFix/>
+          </a:blip>
+          <a:stretch>
+            <a:fillRect/>
+          </a:stretch>
+        </p:blipFill>
+        <p:spPr>
+          <a:xfrm>
+            <a:off x="1870375" y="75825"/>
+            <a:ext cx="7273626" cy="6782175"/>
+          </a:xfrm>
+          <a:prstGeom prst="rect">
+            <a:avLst/>
+          </a:prstGeom>
+          <a:noFill/>
+          <a:ln>
+            <a:noFill/>
+          </a:ln>
+        </p:spPr>
+      </p:pic>
+      <p:sp>
+        <p:nvSpPr>
+          <p:cNvPr id="692" name="Shape 692"/>
+          <p:cNvSpPr txBox="1"/>
+          <p:nvPr/>
+        </p:nvSpPr>
+        <p:spPr>
+          <a:xfrm>
+            <a:off x="0" y="434975"/>
+            <a:ext cx="2740200" cy="1638300"/>
+          </a:xfrm>
+          <a:prstGeom prst="rect">
+            <a:avLst/>
+          </a:prstGeom>
+          <a:noFill/>
+          <a:ln>
+            <a:noFill/>
+          </a:ln>
+        </p:spPr>
+        <p:txBody>
+          <a:bodyPr anchorCtr="0" anchor="t" bIns="91425" lIns="91425" rIns="91425" wrap="square" tIns="91425">
+            <a:noAutofit/>
+          </a:bodyPr>
+          <a:lstStyle/>
+          <a:p>
+            <a:pPr lvl="0">
+              <a:spcBef>
+                <a:spcPts val="0"/>
+              </a:spcBef>
+              <a:buNone/>
+            </a:pPr>
+            <a:r>
+              <a:rPr lang="en-US" sz="2400"/>
+              <a:t>Git Master-&gt;Slave </a:t>
+            </a:r>
+          </a:p>
+          <a:p>
+            <a:pPr lvl="0">
+              <a:spcBef>
+                <a:spcPts val="0"/>
+              </a:spcBef>
+              <a:buNone/>
+            </a:pPr>
+            <a:r>
+              <a:t/>
+            </a:r>
+            <a:endParaRPr sz="2400"/>
+          </a:p>
+          <a:p>
+            <a:pPr lvl="0">
+              <a:spcBef>
+                <a:spcPts val="0"/>
+              </a:spcBef>
+              <a:buNone/>
+            </a:pPr>
+            <a:r>
+              <a:rPr lang="en-US" sz="2400"/>
+              <a:t>Mirroring</a:t>
+            </a:r>
+          </a:p>
+        </p:txBody>
+      </p:sp>
+    </p:spTree>
+  </p:cSld>
+  <p:clrMapOvr>
+    <a:masterClrMapping/>
+  </p:clrMapOvr>
+</p:sld>
+</file>
+
+<file path=ppt/slides/slide51.xml><?xml version="1.0" encoding="utf-8"?>
+<p:sld xmlns:a="http://schemas.openxmlformats.org/drawingml/2006/main" xmlns:r="http://schemas.openxmlformats.org/officeDocument/2006/relationships" xmlns:mc="http://schemas.openxmlformats.org/markup-compatibility/2006" xmlns:mv="urn:schemas-microsoft-com:mac:vml" xmlns:p="http://schemas.openxmlformats.org/presentationml/2006/main" xmlns:c="http://schemas.openxmlformats.org/drawingml/2006/chart" xmlns:dgm="http://schemas.openxmlformats.org/drawingml/2006/diagram" xmlns:o="urn:schemas-microsoft-com:office:office" xmlns:v="urn:schemas-microsoft-com:vml" xmlns:pvml="urn:schemas-microsoft-com:office:powerpoint" xmlns:com="http://schemas.openxmlformats.org/drawingml/2006/compatibility" xmlns:p14="http://schemas.microsoft.com/office/powerpoint/2010/main" xmlns:p15="http://schemas.microsoft.com/office/powerpoint/2012/main">
+  <p:cSld>
+    <p:spTree>
+      <p:nvGrpSpPr>
+        <p:cNvPr id="696" name="Shape 696"/>
+        <p:cNvGrpSpPr/>
+        <p:nvPr/>
+      </p:nvGrpSpPr>
+      <p:grpSpPr>
+        <a:xfrm>
+          <a:off x="0" y="0"/>
+          <a:ext cx="0" cy="0"/>
+          <a:chOff x="0" y="0"/>
+          <a:chExt cx="0" cy="0"/>
+        </a:xfrm>
+      </p:grpSpPr>
+      <p:sp>
+        <p:nvSpPr>
+          <p:cNvPr id="697" name="Shape 697"/>
           <p:cNvSpPr txBox="1"/>
           <p:nvPr>
             <p:ph type="title"/>
@@ -32136,7 +32403,7 @@
       </p:sp>
       <p:sp>
         <p:nvSpPr>
-          <p:cNvPr id="690" name="Shape 690"/>
+          <p:cNvPr id="698" name="Shape 698"/>
           <p:cNvSpPr txBox="1"/>
           <p:nvPr>
             <p:ph idx="1" type="body"/>
@@ -32319,7 +32586,7 @@
       </p:sp>
       <p:sp>
         <p:nvSpPr>
-          <p:cNvPr id="691" name="Shape 691"/>
+          <p:cNvPr id="699" name="Shape 699"/>
           <p:cNvSpPr txBox="1"/>
           <p:nvPr/>
         </p:nvSpPr>
@@ -32376,7 +32643,7 @@
       </p:sp>
       <p:sp>
         <p:nvSpPr>
-          <p:cNvPr id="692" name="Shape 692"/>
+          <p:cNvPr id="700" name="Shape 700"/>
           <p:cNvSpPr txBox="1"/>
           <p:nvPr/>
         </p:nvSpPr>
@@ -32433,7 +32700,7 @@
       </p:sp>
       <p:pic>
         <p:nvPicPr>
-          <p:cNvPr id="693" name="Shape 693"/>
+          <p:cNvPr id="701" name="Shape 701"/>
           <p:cNvPicPr preferRelativeResize="0"/>
           <p:nvPr/>
         </p:nvPicPr>

</xml_diff>